<commit_message>
Uppdaterat länk till wiki-space och nedladdningar. Tagit bort sidor om Firefox (står på Wikin istället).
</commit_message>
<xml_diff>
--- a/docs/groovy-tdd-installation.pptx
+++ b/docs/groovy-tdd-installation.pptx
@@ -5,7 +5,7 @@
     <p:sldMasterId id="2147483710" r:id="rId1"/>
   </p:sldMasterIdLst>
   <p:notesMasterIdLst>
-    <p:notesMasterId r:id="rId17"/>
+    <p:notesMasterId r:id="rId15"/>
   </p:notesMasterIdLst>
   <p:sldIdLst>
     <p:sldId id="256" r:id="rId2"/>
@@ -18,11 +18,9 @@
     <p:sldId id="259" r:id="rId9"/>
     <p:sldId id="265" r:id="rId10"/>
     <p:sldId id="275" r:id="rId11"/>
-    <p:sldId id="276" r:id="rId12"/>
-    <p:sldId id="277" r:id="rId13"/>
-    <p:sldId id="272" r:id="rId14"/>
-    <p:sldId id="273" r:id="rId15"/>
-    <p:sldId id="274" r:id="rId16"/>
+    <p:sldId id="272" r:id="rId12"/>
+    <p:sldId id="273" r:id="rId13"/>
+    <p:sldId id="274" r:id="rId14"/>
   </p:sldIdLst>
   <p:sldSz cx="9144000" cy="6858000" type="screen4x3"/>
   <p:notesSz cx="7315200" cy="9601200"/>
@@ -4548,7 +4546,15 @@
             </a:pPr>
             <a:r>
               <a:rPr lang="en-US" sz="2000" dirty="0" smtClean="0"/>
-              <a:t>This plugin is necessary to install if you use the </a:t>
+              <a:t>This plugin is </a:t>
+            </a:r>
+            <a:r>
+              <a:rPr lang="en-US" sz="2000" dirty="0" smtClean="0"/>
+              <a:t>only necessary </a:t>
+            </a:r>
+            <a:r>
+              <a:rPr lang="en-US" sz="2000" dirty="0" smtClean="0"/>
+              <a:t>to install if you use the </a:t>
             </a:r>
             <a:r>
               <a:rPr lang="en-US" sz="2000" b="1" dirty="0" smtClean="0"/>
@@ -4556,7 +4562,27 @@
             </a:r>
             <a:r>
               <a:rPr lang="en-US" sz="2000" dirty="0" smtClean="0"/>
-              <a:t>package. The plugin </a:t>
+              <a:t>package (i.e. </a:t>
+            </a:r>
+            <a:r>
+              <a:rPr lang="en-US" sz="2000" dirty="0" smtClean="0"/>
+              <a:t>if you are </a:t>
+            </a:r>
+            <a:r>
+              <a:rPr lang="en-US" sz="2000" b="1" dirty="0" smtClean="0"/>
+              <a:t>not</a:t>
+            </a:r>
+            <a:r>
+              <a:rPr lang="en-US" sz="2000" dirty="0" smtClean="0"/>
+              <a:t> using the Java or Java EE eclipse package)</a:t>
+            </a:r>
+            <a:r>
+              <a:rPr lang="en-US" sz="2000" dirty="0" smtClean="0"/>
+              <a:t>. </a:t>
+            </a:r>
+            <a:r>
+              <a:rPr lang="en-US" sz="2000" dirty="0" smtClean="0"/>
+              <a:t>The plugin </a:t>
             </a:r>
             <a:r>
               <a:rPr lang="en-US" sz="2000" dirty="0"/>
@@ -4945,30 +4971,16 @@
             <p:ph type="ctrTitle"/>
           </p:nvPr>
         </p:nvSpPr>
-        <p:spPr>
-          <a:xfrm>
-            <a:off x="685800" y="570922"/>
-            <a:ext cx="7772400" cy="985870"/>
-          </a:xfrm>
-        </p:spPr>
+        <p:spPr/>
         <p:txBody>
-          <a:bodyPr anchor="t">
-            <a:normAutofit fontScale="90000"/>
-          </a:bodyPr>
+          <a:bodyPr anchor="t"/>
           <a:lstStyle/>
           <a:p>
             <a:r>
               <a:rPr lang="en-US" dirty="0" smtClean="0"/>
-              <a:t>Firefox Installation</a:t>
-            </a:r>
-            <a:br>
-              <a:rPr lang="en-US" dirty="0" smtClean="0"/>
-            </a:br>
-            <a:r>
-              <a:rPr lang="en-US" sz="2700" dirty="0" smtClean="0"/>
-              <a:t>Windows</a:t>
-            </a:r>
-            <a:endParaRPr lang="en-US" sz="2700" dirty="0"/>
+              <a:t>Import project into Eclipse</a:t>
+            </a:r>
+            <a:endParaRPr lang="en-US" dirty="0"/>
           </a:p>
         </p:txBody>
       </p:sp>
@@ -4987,722 +4999,19 @@
           <a:bodyPr/>
           <a:lstStyle/>
           <a:p>
-            <a:pPr marL="457200" indent="-457200">
-              <a:buFont typeface="+mj-lt"/>
-              <a:buAutoNum type="arabicPeriod"/>
-            </a:pPr>
-            <a:r>
-              <a:rPr lang="en-US" sz="2000" dirty="0"/>
-              <a:t>Visit the Firefox download page</a:t>
-            </a:r>
-          </a:p>
-          <a:p>
-            <a:pPr marL="457200" indent="-457200">
-              <a:buFont typeface="+mj-lt"/>
-              <a:buAutoNum type="arabicPeriod"/>
-            </a:pPr>
+            <a:r>
+              <a:rPr lang="en-US" sz="2000" smtClean="0"/>
+              <a:t>Download </a:t>
+            </a:r>
+            <a:r>
+              <a:rPr lang="en-US" sz="2000" smtClean="0"/>
+              <a:t>example </a:t>
+            </a:r>
+            <a:r>
+              <a:rPr lang="en-US" sz="2000" dirty="0" smtClean="0"/>
+              <a:t>project from</a:t>
+            </a:r>
             <a:endParaRPr lang="en-US" sz="2000" dirty="0" smtClean="0"/>
-          </a:p>
-          <a:p>
-            <a:pPr marL="457200" indent="-457200">
-              <a:buFont typeface="+mj-lt"/>
-              <a:buAutoNum type="arabicPeriod"/>
-            </a:pPr>
-            <a:endParaRPr lang="en-US" sz="2000" dirty="0" smtClean="0"/>
-          </a:p>
-          <a:p>
-            <a:pPr marL="457200" indent="-457200">
-              <a:buFont typeface="+mj-lt"/>
-              <a:buAutoNum type="arabicPeriod"/>
-            </a:pPr>
-            <a:r>
-              <a:rPr lang="en-US" sz="2000" dirty="0"/>
-              <a:t>Click on the green download link to download the Firefox </a:t>
-            </a:r>
-            <a:r>
-              <a:rPr lang="en-US" sz="2000" dirty="0" smtClean="0"/>
-              <a:t>installer</a:t>
-            </a:r>
-          </a:p>
-          <a:p>
-            <a:pPr marL="457200" indent="-457200">
-              <a:buFont typeface="+mj-lt"/>
-              <a:buAutoNum type="arabicPeriod"/>
-            </a:pPr>
-            <a:r>
-              <a:rPr lang="en-US" sz="2000" dirty="0" smtClean="0"/>
-              <a:t>Start the process by running the installer</a:t>
-            </a:r>
-          </a:p>
-          <a:p>
-            <a:pPr marL="457200" indent="-457200">
-              <a:buFont typeface="+mj-lt"/>
-              <a:buAutoNum type="arabicPeriod"/>
-            </a:pPr>
-            <a:r>
-              <a:rPr lang="en-US" sz="2000" dirty="0" smtClean="0"/>
-              <a:t>Then, just follow the steps…</a:t>
-            </a:r>
-          </a:p>
-          <a:p>
-            <a:pPr marL="457200" indent="-457200">
-              <a:buFont typeface="+mj-lt"/>
-              <a:buAutoNum type="arabicPeriod"/>
-            </a:pPr>
-            <a:endParaRPr lang="en-US" sz="2000" dirty="0"/>
-          </a:p>
-        </p:txBody>
-      </p:sp>
-      <p:sp>
-        <p:nvSpPr>
-          <p:cNvPr id="4" name="Text Placeholder 2"/>
-          <p:cNvSpPr txBox="1">
-            <a:spLocks/>
-          </p:cNvSpPr>
-          <p:nvPr/>
-        </p:nvSpPr>
-        <p:spPr>
-          <a:xfrm>
-            <a:off x="1261865" y="2060848"/>
-            <a:ext cx="5830415" cy="576064"/>
-          </a:xfrm>
-          <a:prstGeom prst="roundRect">
-            <a:avLst/>
-          </a:prstGeom>
-          <a:solidFill>
-            <a:schemeClr val="accent1">
-              <a:lumMod val="20000"/>
-              <a:lumOff val="80000"/>
-            </a:schemeClr>
-          </a:solidFill>
-          <a:ln w="12700" cap="rnd" cmpd="sng">
-            <a:solidFill>
-              <a:schemeClr val="tx1"/>
-            </a:solidFill>
-            <a:round/>
-          </a:ln>
-          <a:effectLst>
-            <a:outerShdw blurRad="50800" dist="38100" dir="2700000" algn="tl" rotWithShape="0">
-              <a:schemeClr val="accent1">
-                <a:lumMod val="75000"/>
-                <a:alpha val="43000"/>
-              </a:schemeClr>
-            </a:outerShdw>
-          </a:effectLst>
-        </p:spPr>
-        <p:txBody>
-          <a:bodyPr anchor="ctr"/>
-          <a:lstStyle>
-            <a:lvl1pPr marL="342900" indent="-342900" algn="l" defTabSz="457200" rtl="0" eaLnBrk="1" fontAlgn="base" hangingPunct="1">
-              <a:spcBef>
-                <a:spcPct val="20000"/>
-              </a:spcBef>
-              <a:spcAft>
-                <a:spcPct val="0"/>
-              </a:spcAft>
-              <a:buFont typeface="Arial" charset="0"/>
-              <a:buChar char="•"/>
-              <a:defRPr sz="2400" kern="1200">
-                <a:solidFill>
-                  <a:schemeClr val="tx1"/>
-                </a:solidFill>
-                <a:latin typeface="+mn-lt"/>
-                <a:ea typeface="ＭＳ Ｐゴシック" pitchFamily="-111" charset="-128"/>
-                <a:cs typeface="ＭＳ Ｐゴシック" pitchFamily="-111" charset="-128"/>
-              </a:defRPr>
-            </a:lvl1pPr>
-            <a:lvl2pPr marL="742950" indent="-285750" algn="l" defTabSz="457200" rtl="0" eaLnBrk="1" fontAlgn="base" hangingPunct="1">
-              <a:spcBef>
-                <a:spcPct val="20000"/>
-              </a:spcBef>
-              <a:spcAft>
-                <a:spcPct val="0"/>
-              </a:spcAft>
-              <a:buFont typeface="Arial" charset="0"/>
-              <a:buChar char="–"/>
-              <a:defRPr sz="2200" kern="1200">
-                <a:solidFill>
-                  <a:schemeClr val="tx1"/>
-                </a:solidFill>
-                <a:latin typeface="+mn-lt"/>
-                <a:ea typeface="ＭＳ Ｐゴシック" pitchFamily="-111" charset="-128"/>
-                <a:cs typeface="ＭＳ Ｐゴシック"/>
-              </a:defRPr>
-            </a:lvl2pPr>
-            <a:lvl3pPr marL="1143000" indent="-228600" algn="l" defTabSz="457200" rtl="0" eaLnBrk="1" fontAlgn="base" hangingPunct="1">
-              <a:spcBef>
-                <a:spcPct val="20000"/>
-              </a:spcBef>
-              <a:spcAft>
-                <a:spcPct val="0"/>
-              </a:spcAft>
-              <a:buFont typeface="Calibri" pitchFamily="34" charset="0"/>
-              <a:buChar char="»"/>
-              <a:defRPr sz="2000" kern="1200">
-                <a:solidFill>
-                  <a:schemeClr val="tx1"/>
-                </a:solidFill>
-                <a:latin typeface="+mn-lt"/>
-                <a:ea typeface="ＭＳ Ｐゴシック" pitchFamily="-111" charset="-128"/>
-                <a:cs typeface="ＭＳ Ｐゴシック"/>
-              </a:defRPr>
-            </a:lvl3pPr>
-            <a:lvl4pPr marL="1600200" indent="-228600" algn="l" defTabSz="457200" rtl="0" eaLnBrk="1" fontAlgn="base" hangingPunct="1">
-              <a:spcBef>
-                <a:spcPct val="20000"/>
-              </a:spcBef>
-              <a:spcAft>
-                <a:spcPct val="0"/>
-              </a:spcAft>
-              <a:buFont typeface="Arial" charset="0"/>
-              <a:buChar char="–"/>
-              <a:defRPr sz="1800" kern="1200">
-                <a:solidFill>
-                  <a:schemeClr val="tx1">
-                    <a:lumMod val="75000"/>
-                    <a:lumOff val="25000"/>
-                  </a:schemeClr>
-                </a:solidFill>
-                <a:latin typeface="+mn-lt"/>
-                <a:ea typeface="ＭＳ Ｐゴシック" pitchFamily="-111" charset="-128"/>
-                <a:cs typeface="ＭＳ Ｐゴシック"/>
-              </a:defRPr>
-            </a:lvl4pPr>
-            <a:lvl5pPr marL="2057400" indent="-228600" algn="l" defTabSz="457200" rtl="0" eaLnBrk="1" fontAlgn="base" hangingPunct="1">
-              <a:spcBef>
-                <a:spcPct val="20000"/>
-              </a:spcBef>
-              <a:spcAft>
-                <a:spcPct val="0"/>
-              </a:spcAft>
-              <a:buFont typeface="Arial" charset="0"/>
-              <a:buChar char="»"/>
-              <a:defRPr sz="1800" kern="1200">
-                <a:solidFill>
-                  <a:schemeClr val="tx1">
-                    <a:lumMod val="75000"/>
-                    <a:lumOff val="25000"/>
-                  </a:schemeClr>
-                </a:solidFill>
-                <a:latin typeface="+mn-lt"/>
-                <a:ea typeface="ＭＳ Ｐゴシック" pitchFamily="-111" charset="-128"/>
-                <a:cs typeface="ＭＳ Ｐゴシック"/>
-              </a:defRPr>
-            </a:lvl5pPr>
-            <a:lvl6pPr marL="2514600" indent="-228600" algn="l" defTabSz="457200" rtl="0" eaLnBrk="1" latinLnBrk="0" hangingPunct="1">
-              <a:spcBef>
-                <a:spcPct val="20000"/>
-              </a:spcBef>
-              <a:buFont typeface="Arial"/>
-              <a:buChar char="•"/>
-              <a:defRPr sz="2000" kern="1200">
-                <a:solidFill>
-                  <a:schemeClr val="tx1"/>
-                </a:solidFill>
-                <a:latin typeface="+mn-lt"/>
-                <a:ea typeface="+mn-ea"/>
-                <a:cs typeface="+mn-cs"/>
-              </a:defRPr>
-            </a:lvl6pPr>
-            <a:lvl7pPr marL="2971800" indent="-228600" algn="l" defTabSz="457200" rtl="0" eaLnBrk="1" latinLnBrk="0" hangingPunct="1">
-              <a:spcBef>
-                <a:spcPct val="20000"/>
-              </a:spcBef>
-              <a:buFont typeface="Arial"/>
-              <a:buChar char="•"/>
-              <a:defRPr sz="2000" kern="1200">
-                <a:solidFill>
-                  <a:schemeClr val="tx1"/>
-                </a:solidFill>
-                <a:latin typeface="+mn-lt"/>
-                <a:ea typeface="+mn-ea"/>
-                <a:cs typeface="+mn-cs"/>
-              </a:defRPr>
-            </a:lvl7pPr>
-            <a:lvl8pPr marL="3429000" indent="-228600" algn="l" defTabSz="457200" rtl="0" eaLnBrk="1" latinLnBrk="0" hangingPunct="1">
-              <a:spcBef>
-                <a:spcPct val="20000"/>
-              </a:spcBef>
-              <a:buFont typeface="Arial"/>
-              <a:buChar char="•"/>
-              <a:defRPr sz="2000" kern="1200">
-                <a:solidFill>
-                  <a:schemeClr val="tx1"/>
-                </a:solidFill>
-                <a:latin typeface="+mn-lt"/>
-                <a:ea typeface="+mn-ea"/>
-                <a:cs typeface="+mn-cs"/>
-              </a:defRPr>
-            </a:lvl8pPr>
-            <a:lvl9pPr marL="3886200" indent="-228600" algn="l" defTabSz="457200" rtl="0" eaLnBrk="1" latinLnBrk="0" hangingPunct="1">
-              <a:spcBef>
-                <a:spcPct val="20000"/>
-              </a:spcBef>
-              <a:buFont typeface="Arial"/>
-              <a:buChar char="•"/>
-              <a:defRPr sz="2000" kern="1200">
-                <a:solidFill>
-                  <a:schemeClr val="tx1"/>
-                </a:solidFill>
-                <a:latin typeface="+mn-lt"/>
-                <a:ea typeface="+mn-ea"/>
-                <a:cs typeface="+mn-cs"/>
-              </a:defRPr>
-            </a:lvl9pPr>
-          </a:lstStyle>
-          <a:p>
-            <a:pPr marL="0" indent="0">
-              <a:buNone/>
-            </a:pPr>
-            <a:r>
-              <a:rPr lang="en-US" sz="1800" dirty="0"/>
-              <a:t>http://</a:t>
-            </a:r>
-            <a:r>
-              <a:rPr lang="en-US" sz="1800" dirty="0" err="1"/>
-              <a:t>www.getfirefox.com</a:t>
-            </a:r>
-            <a:r>
-              <a:rPr lang="en-US" sz="1800" dirty="0"/>
-              <a:t>/</a:t>
-            </a:r>
-            <a:endParaRPr lang="en-US" sz="1800" dirty="0"/>
-          </a:p>
-        </p:txBody>
-      </p:sp>
-    </p:spTree>
-    <p:extLst>
-      <p:ext uri="{BB962C8B-B14F-4D97-AF65-F5344CB8AC3E}">
-        <p14:creationId xmlns:p14="http://schemas.microsoft.com/office/powerpoint/2010/main" val="3592842182"/>
-      </p:ext>
-    </p:extLst>
-  </p:cSld>
-  <p:clrMapOvr>
-    <a:masterClrMapping/>
-  </p:clrMapOvr>
-</p:sld>
-</file>
-
-<file path=ppt/slides/slide12.xml><?xml version="1.0" encoding="utf-8"?>
-<p:sld xmlns:a="http://schemas.openxmlformats.org/drawingml/2006/main" xmlns:r="http://schemas.openxmlformats.org/officeDocument/2006/relationships" xmlns:p="http://schemas.openxmlformats.org/presentationml/2006/main">
-  <p:cSld>
-    <p:spTree>
-      <p:nvGrpSpPr>
-        <p:cNvPr id="1" name=""/>
-        <p:cNvGrpSpPr/>
-        <p:nvPr/>
-      </p:nvGrpSpPr>
-      <p:grpSpPr>
-        <a:xfrm>
-          <a:off x="0" y="0"/>
-          <a:ext cx="0" cy="0"/>
-          <a:chOff x="0" y="0"/>
-          <a:chExt cx="0" cy="0"/>
-        </a:xfrm>
-      </p:grpSpPr>
-      <p:sp>
-        <p:nvSpPr>
-          <p:cNvPr id="2" name="Title 1"/>
-          <p:cNvSpPr>
-            <a:spLocks noGrp="1"/>
-          </p:cNvSpPr>
-          <p:nvPr>
-            <p:ph type="ctrTitle"/>
-          </p:nvPr>
-        </p:nvSpPr>
-        <p:spPr>
-          <a:xfrm>
-            <a:off x="685800" y="570922"/>
-            <a:ext cx="7772400" cy="985870"/>
-          </a:xfrm>
-        </p:spPr>
-        <p:txBody>
-          <a:bodyPr anchor="t">
-            <a:normAutofit fontScale="90000"/>
-          </a:bodyPr>
-          <a:lstStyle/>
-          <a:p>
-            <a:r>
-              <a:rPr lang="en-US" dirty="0" smtClean="0"/>
-              <a:t>Firefox Installation</a:t>
-            </a:r>
-            <a:br>
-              <a:rPr lang="en-US" dirty="0" smtClean="0"/>
-            </a:br>
-            <a:r>
-              <a:rPr lang="en-US" sz="2700" dirty="0" smtClean="0"/>
-              <a:t>Mac OS X</a:t>
-            </a:r>
-            <a:endParaRPr lang="en-US" sz="2700" dirty="0"/>
-          </a:p>
-        </p:txBody>
-      </p:sp>
-      <p:sp>
-        <p:nvSpPr>
-          <p:cNvPr id="3" name="Text Placeholder 2"/>
-          <p:cNvSpPr>
-            <a:spLocks noGrp="1"/>
-          </p:cNvSpPr>
-          <p:nvPr>
-            <p:ph type="body" sz="quarter" idx="13"/>
-          </p:nvPr>
-        </p:nvSpPr>
-        <p:spPr/>
-        <p:txBody>
-          <a:bodyPr/>
-          <a:lstStyle/>
-          <a:p>
-            <a:pPr marL="457200" indent="-457200">
-              <a:buFont typeface="+mj-lt"/>
-              <a:buAutoNum type="arabicPeriod"/>
-            </a:pPr>
-            <a:r>
-              <a:rPr lang="en-US" sz="2000" dirty="0"/>
-              <a:t>Visit the Firefox download page</a:t>
-            </a:r>
-          </a:p>
-          <a:p>
-            <a:pPr marL="457200" indent="-457200">
-              <a:buFont typeface="+mj-lt"/>
-              <a:buAutoNum type="arabicPeriod"/>
-            </a:pPr>
-            <a:endParaRPr lang="en-US" sz="2000" dirty="0" smtClean="0"/>
-          </a:p>
-          <a:p>
-            <a:pPr marL="457200" indent="-457200">
-              <a:buFont typeface="+mj-lt"/>
-              <a:buAutoNum type="arabicPeriod"/>
-            </a:pPr>
-            <a:endParaRPr lang="en-US" sz="2000" dirty="0" smtClean="0"/>
-          </a:p>
-          <a:p>
-            <a:pPr marL="457200" indent="-457200">
-              <a:buFont typeface="+mj-lt"/>
-              <a:buAutoNum type="arabicPeriod"/>
-            </a:pPr>
-            <a:r>
-              <a:rPr lang="en-US" sz="2000" dirty="0"/>
-              <a:t>Click on the green download link to download </a:t>
-            </a:r>
-            <a:r>
-              <a:rPr lang="en-US" sz="2000" dirty="0" smtClean="0"/>
-              <a:t>Firefox</a:t>
-            </a:r>
-          </a:p>
-          <a:p>
-            <a:pPr marL="457200" indent="-457200">
-              <a:buFont typeface="+mj-lt"/>
-              <a:buAutoNum type="arabicPeriod"/>
-            </a:pPr>
-            <a:r>
-              <a:rPr lang="en-US" sz="2000" dirty="0"/>
-              <a:t>Once the download has completed, the file (</a:t>
-            </a:r>
-            <a:r>
-              <a:rPr lang="en-US" sz="2000" dirty="0" err="1"/>
-              <a:t>Firefox.dmg</a:t>
-            </a:r>
-            <a:r>
-              <a:rPr lang="en-US" sz="2000" dirty="0"/>
-              <a:t>) should open by itself and pop open a Finder window containing the Firefox application. Drag the Firefox Icon on top of the Applications folder in order to copy it </a:t>
-            </a:r>
-            <a:r>
-              <a:rPr lang="en-US" sz="2000" dirty="0" smtClean="0"/>
-              <a:t>there</a:t>
-            </a:r>
-            <a:endParaRPr lang="en-US" sz="2000" dirty="0"/>
-          </a:p>
-        </p:txBody>
-      </p:sp>
-      <p:sp>
-        <p:nvSpPr>
-          <p:cNvPr id="4" name="Text Placeholder 2"/>
-          <p:cNvSpPr txBox="1">
-            <a:spLocks/>
-          </p:cNvSpPr>
-          <p:nvPr/>
-        </p:nvSpPr>
-        <p:spPr>
-          <a:xfrm>
-            <a:off x="1261865" y="2060848"/>
-            <a:ext cx="5830415" cy="576064"/>
-          </a:xfrm>
-          <a:prstGeom prst="roundRect">
-            <a:avLst/>
-          </a:prstGeom>
-          <a:solidFill>
-            <a:schemeClr val="accent1">
-              <a:lumMod val="20000"/>
-              <a:lumOff val="80000"/>
-            </a:schemeClr>
-          </a:solidFill>
-          <a:ln w="12700" cap="rnd" cmpd="sng">
-            <a:solidFill>
-              <a:schemeClr val="tx1"/>
-            </a:solidFill>
-            <a:round/>
-          </a:ln>
-          <a:effectLst>
-            <a:outerShdw blurRad="50800" dist="38100" dir="2700000" algn="tl" rotWithShape="0">
-              <a:schemeClr val="accent1">
-                <a:lumMod val="75000"/>
-                <a:alpha val="43000"/>
-              </a:schemeClr>
-            </a:outerShdw>
-          </a:effectLst>
-        </p:spPr>
-        <p:txBody>
-          <a:bodyPr anchor="ctr"/>
-          <a:lstStyle>
-            <a:lvl1pPr marL="342900" indent="-342900" algn="l" defTabSz="457200" rtl="0" eaLnBrk="1" fontAlgn="base" hangingPunct="1">
-              <a:spcBef>
-                <a:spcPct val="20000"/>
-              </a:spcBef>
-              <a:spcAft>
-                <a:spcPct val="0"/>
-              </a:spcAft>
-              <a:buFont typeface="Arial" charset="0"/>
-              <a:buChar char="•"/>
-              <a:defRPr sz="2400" kern="1200">
-                <a:solidFill>
-                  <a:schemeClr val="tx1"/>
-                </a:solidFill>
-                <a:latin typeface="+mn-lt"/>
-                <a:ea typeface="ＭＳ Ｐゴシック" pitchFamily="-111" charset="-128"/>
-                <a:cs typeface="ＭＳ Ｐゴシック" pitchFamily="-111" charset="-128"/>
-              </a:defRPr>
-            </a:lvl1pPr>
-            <a:lvl2pPr marL="742950" indent="-285750" algn="l" defTabSz="457200" rtl="0" eaLnBrk="1" fontAlgn="base" hangingPunct="1">
-              <a:spcBef>
-                <a:spcPct val="20000"/>
-              </a:spcBef>
-              <a:spcAft>
-                <a:spcPct val="0"/>
-              </a:spcAft>
-              <a:buFont typeface="Arial" charset="0"/>
-              <a:buChar char="–"/>
-              <a:defRPr sz="2200" kern="1200">
-                <a:solidFill>
-                  <a:schemeClr val="tx1"/>
-                </a:solidFill>
-                <a:latin typeface="+mn-lt"/>
-                <a:ea typeface="ＭＳ Ｐゴシック" pitchFamily="-111" charset="-128"/>
-                <a:cs typeface="ＭＳ Ｐゴシック"/>
-              </a:defRPr>
-            </a:lvl2pPr>
-            <a:lvl3pPr marL="1143000" indent="-228600" algn="l" defTabSz="457200" rtl="0" eaLnBrk="1" fontAlgn="base" hangingPunct="1">
-              <a:spcBef>
-                <a:spcPct val="20000"/>
-              </a:spcBef>
-              <a:spcAft>
-                <a:spcPct val="0"/>
-              </a:spcAft>
-              <a:buFont typeface="Calibri" pitchFamily="34" charset="0"/>
-              <a:buChar char="»"/>
-              <a:defRPr sz="2000" kern="1200">
-                <a:solidFill>
-                  <a:schemeClr val="tx1"/>
-                </a:solidFill>
-                <a:latin typeface="+mn-lt"/>
-                <a:ea typeface="ＭＳ Ｐゴシック" pitchFamily="-111" charset="-128"/>
-                <a:cs typeface="ＭＳ Ｐゴシック"/>
-              </a:defRPr>
-            </a:lvl3pPr>
-            <a:lvl4pPr marL="1600200" indent="-228600" algn="l" defTabSz="457200" rtl="0" eaLnBrk="1" fontAlgn="base" hangingPunct="1">
-              <a:spcBef>
-                <a:spcPct val="20000"/>
-              </a:spcBef>
-              <a:spcAft>
-                <a:spcPct val="0"/>
-              </a:spcAft>
-              <a:buFont typeface="Arial" charset="0"/>
-              <a:buChar char="–"/>
-              <a:defRPr sz="1800" kern="1200">
-                <a:solidFill>
-                  <a:schemeClr val="tx1">
-                    <a:lumMod val="75000"/>
-                    <a:lumOff val="25000"/>
-                  </a:schemeClr>
-                </a:solidFill>
-                <a:latin typeface="+mn-lt"/>
-                <a:ea typeface="ＭＳ Ｐゴシック" pitchFamily="-111" charset="-128"/>
-                <a:cs typeface="ＭＳ Ｐゴシック"/>
-              </a:defRPr>
-            </a:lvl4pPr>
-            <a:lvl5pPr marL="2057400" indent="-228600" algn="l" defTabSz="457200" rtl="0" eaLnBrk="1" fontAlgn="base" hangingPunct="1">
-              <a:spcBef>
-                <a:spcPct val="20000"/>
-              </a:spcBef>
-              <a:spcAft>
-                <a:spcPct val="0"/>
-              </a:spcAft>
-              <a:buFont typeface="Arial" charset="0"/>
-              <a:buChar char="»"/>
-              <a:defRPr sz="1800" kern="1200">
-                <a:solidFill>
-                  <a:schemeClr val="tx1">
-                    <a:lumMod val="75000"/>
-                    <a:lumOff val="25000"/>
-                  </a:schemeClr>
-                </a:solidFill>
-                <a:latin typeface="+mn-lt"/>
-                <a:ea typeface="ＭＳ Ｐゴシック" pitchFamily="-111" charset="-128"/>
-                <a:cs typeface="ＭＳ Ｐゴシック"/>
-              </a:defRPr>
-            </a:lvl5pPr>
-            <a:lvl6pPr marL="2514600" indent="-228600" algn="l" defTabSz="457200" rtl="0" eaLnBrk="1" latinLnBrk="0" hangingPunct="1">
-              <a:spcBef>
-                <a:spcPct val="20000"/>
-              </a:spcBef>
-              <a:buFont typeface="Arial"/>
-              <a:buChar char="•"/>
-              <a:defRPr sz="2000" kern="1200">
-                <a:solidFill>
-                  <a:schemeClr val="tx1"/>
-                </a:solidFill>
-                <a:latin typeface="+mn-lt"/>
-                <a:ea typeface="+mn-ea"/>
-                <a:cs typeface="+mn-cs"/>
-              </a:defRPr>
-            </a:lvl6pPr>
-            <a:lvl7pPr marL="2971800" indent="-228600" algn="l" defTabSz="457200" rtl="0" eaLnBrk="1" latinLnBrk="0" hangingPunct="1">
-              <a:spcBef>
-                <a:spcPct val="20000"/>
-              </a:spcBef>
-              <a:buFont typeface="Arial"/>
-              <a:buChar char="•"/>
-              <a:defRPr sz="2000" kern="1200">
-                <a:solidFill>
-                  <a:schemeClr val="tx1"/>
-                </a:solidFill>
-                <a:latin typeface="+mn-lt"/>
-                <a:ea typeface="+mn-ea"/>
-                <a:cs typeface="+mn-cs"/>
-              </a:defRPr>
-            </a:lvl7pPr>
-            <a:lvl8pPr marL="3429000" indent="-228600" algn="l" defTabSz="457200" rtl="0" eaLnBrk="1" latinLnBrk="0" hangingPunct="1">
-              <a:spcBef>
-                <a:spcPct val="20000"/>
-              </a:spcBef>
-              <a:buFont typeface="Arial"/>
-              <a:buChar char="•"/>
-              <a:defRPr sz="2000" kern="1200">
-                <a:solidFill>
-                  <a:schemeClr val="tx1"/>
-                </a:solidFill>
-                <a:latin typeface="+mn-lt"/>
-                <a:ea typeface="+mn-ea"/>
-                <a:cs typeface="+mn-cs"/>
-              </a:defRPr>
-            </a:lvl8pPr>
-            <a:lvl9pPr marL="3886200" indent="-228600" algn="l" defTabSz="457200" rtl="0" eaLnBrk="1" latinLnBrk="0" hangingPunct="1">
-              <a:spcBef>
-                <a:spcPct val="20000"/>
-              </a:spcBef>
-              <a:buFont typeface="Arial"/>
-              <a:buChar char="•"/>
-              <a:defRPr sz="2000" kern="1200">
-                <a:solidFill>
-                  <a:schemeClr val="tx1"/>
-                </a:solidFill>
-                <a:latin typeface="+mn-lt"/>
-                <a:ea typeface="+mn-ea"/>
-                <a:cs typeface="+mn-cs"/>
-              </a:defRPr>
-            </a:lvl9pPr>
-          </a:lstStyle>
-          <a:p>
-            <a:pPr marL="0" indent="0">
-              <a:buNone/>
-            </a:pPr>
-            <a:r>
-              <a:rPr lang="en-US" sz="1800" dirty="0"/>
-              <a:t>http://</a:t>
-            </a:r>
-            <a:r>
-              <a:rPr lang="en-US" sz="1800" dirty="0" err="1"/>
-              <a:t>www.getfirefox.com</a:t>
-            </a:r>
-            <a:r>
-              <a:rPr lang="en-US" sz="1800" dirty="0"/>
-              <a:t>/</a:t>
-            </a:r>
-            <a:endParaRPr lang="en-US" sz="1800" dirty="0"/>
-          </a:p>
-        </p:txBody>
-      </p:sp>
-    </p:spTree>
-    <p:extLst>
-      <p:ext uri="{BB962C8B-B14F-4D97-AF65-F5344CB8AC3E}">
-        <p14:creationId xmlns:p14="http://schemas.microsoft.com/office/powerpoint/2010/main" val="1427391776"/>
-      </p:ext>
-    </p:extLst>
-  </p:cSld>
-  <p:clrMapOvr>
-    <a:masterClrMapping/>
-  </p:clrMapOvr>
-</p:sld>
-</file>
-
-<file path=ppt/slides/slide13.xml><?xml version="1.0" encoding="utf-8"?>
-<p:sld xmlns:a="http://schemas.openxmlformats.org/drawingml/2006/main" xmlns:r="http://schemas.openxmlformats.org/officeDocument/2006/relationships" xmlns:p="http://schemas.openxmlformats.org/presentationml/2006/main">
-  <p:cSld>
-    <p:spTree>
-      <p:nvGrpSpPr>
-        <p:cNvPr id="1" name=""/>
-        <p:cNvGrpSpPr/>
-        <p:nvPr/>
-      </p:nvGrpSpPr>
-      <p:grpSpPr>
-        <a:xfrm>
-          <a:off x="0" y="0"/>
-          <a:ext cx="0" cy="0"/>
-          <a:chOff x="0" y="0"/>
-          <a:chExt cx="0" cy="0"/>
-        </a:xfrm>
-      </p:grpSpPr>
-      <p:sp>
-        <p:nvSpPr>
-          <p:cNvPr id="2" name="Title 1"/>
-          <p:cNvSpPr>
-            <a:spLocks noGrp="1"/>
-          </p:cNvSpPr>
-          <p:nvPr>
-            <p:ph type="ctrTitle"/>
-          </p:nvPr>
-        </p:nvSpPr>
-        <p:spPr/>
-        <p:txBody>
-          <a:bodyPr anchor="t"/>
-          <a:lstStyle/>
-          <a:p>
-            <a:r>
-              <a:rPr lang="en-US" dirty="0" smtClean="0"/>
-              <a:t>Import project into Eclipse</a:t>
-            </a:r>
-            <a:endParaRPr lang="en-US" dirty="0"/>
-          </a:p>
-        </p:txBody>
-      </p:sp>
-      <p:sp>
-        <p:nvSpPr>
-          <p:cNvPr id="3" name="Text Placeholder 2"/>
-          <p:cNvSpPr>
-            <a:spLocks noGrp="1"/>
-          </p:cNvSpPr>
-          <p:nvPr>
-            <p:ph type="body" sz="quarter" idx="13"/>
-          </p:nvPr>
-        </p:nvSpPr>
-        <p:spPr/>
-        <p:txBody>
-          <a:bodyPr/>
-          <a:lstStyle/>
-          <a:p>
-            <a:r>
-              <a:rPr lang="en-US" sz="2000" dirty="0" smtClean="0"/>
-              <a:t>Download source code from</a:t>
-            </a:r>
           </a:p>
           <a:p>
             <a:endParaRPr lang="en-US" sz="2000" dirty="0"/>
@@ -5724,8 +5033,13 @@
           <a:p>
             <a:r>
               <a:rPr lang="en-US" sz="2000" dirty="0" smtClean="0"/>
-              <a:t>Unzip to a working directory</a:t>
-            </a:r>
+              <a:t>Unzip to a working </a:t>
+            </a:r>
+            <a:r>
+              <a:rPr lang="en-US" sz="2000" dirty="0" smtClean="0"/>
+              <a:t>directory of your choice</a:t>
+            </a:r>
+            <a:endParaRPr lang="en-US" sz="2000" dirty="0" smtClean="0"/>
           </a:p>
           <a:p>
             <a:r>
@@ -6013,11 +5327,27 @@
             </a:pPr>
             <a:r>
               <a:rPr lang="en-US" sz="2000" dirty="0"/>
-              <a:t>http://www.callistaenterprise.se/vadgorvi/cadec/xxxxxxxx/</a:t>
-            </a:r>
-            <a:r>
-              <a:rPr lang="en-US" sz="2000" dirty="0" smtClean="0"/>
-              <a:t>cadec2014_groovy_tdd.zip</a:t>
+              <a:t>https://</a:t>
+            </a:r>
+            <a:r>
+              <a:rPr lang="en-US" sz="2000" dirty="0" err="1"/>
+              <a:t>callista.adaptavist.com</a:t>
+            </a:r>
+            <a:r>
+              <a:rPr lang="en-US" sz="2000" dirty="0"/>
+              <a:t>/download/attachments/20907671/groovy-</a:t>
+            </a:r>
+            <a:r>
+              <a:rPr lang="en-US" sz="2000" dirty="0" err="1"/>
+              <a:t>tdd</a:t>
+            </a:r>
+            <a:r>
+              <a:rPr lang="en-US" sz="2000" dirty="0"/>
+              <a:t>-</a:t>
+            </a:r>
+            <a:r>
+              <a:rPr lang="en-US" sz="2000" dirty="0" err="1" smtClean="0"/>
+              <a:t>cadec.zip</a:t>
             </a:r>
             <a:endParaRPr lang="en-US" sz="2000" dirty="0"/>
           </a:p>
@@ -6036,7 +5366,7 @@
 </p:sld>
 </file>
 
-<file path=ppt/slides/slide14.xml><?xml version="1.0" encoding="utf-8"?>
+<file path=ppt/slides/slide12.xml><?xml version="1.0" encoding="utf-8"?>
 <p:sld xmlns:a="http://schemas.openxmlformats.org/drawingml/2006/main" xmlns:r="http://schemas.openxmlformats.org/officeDocument/2006/relationships" xmlns:p="http://schemas.openxmlformats.org/presentationml/2006/main">
   <p:cSld>
     <p:spTree>
@@ -6231,7 +5561,7 @@
 </p:sld>
 </file>
 
-<file path=ppt/slides/slide15.xml><?xml version="1.0" encoding="utf-8"?>
+<file path=ppt/slides/slide13.xml><?xml version="1.0" encoding="utf-8"?>
 <p:sld xmlns:a="http://schemas.openxmlformats.org/drawingml/2006/main" xmlns:r="http://schemas.openxmlformats.org/officeDocument/2006/relationships" xmlns:p="http://schemas.openxmlformats.org/presentationml/2006/main">
   <p:cSld>
     <p:spTree>
@@ -6747,7 +6077,6 @@
               <a:rPr lang="en-US" sz="1600" dirty="0" smtClean="0"/>
               <a:t>Maven Integration for Eclipse</a:t>
             </a:r>
-            <a:endParaRPr lang="en-US" sz="1600" dirty="0" smtClean="0"/>
           </a:p>
           <a:p>
             <a:r>
@@ -6768,7 +6097,6 @@
               <a:rPr lang="en-US" sz="1600" dirty="0" smtClean="0"/>
               <a:t>Mac OS X</a:t>
             </a:r>
-            <a:endParaRPr lang="en-US" sz="1600" dirty="0" smtClean="0"/>
           </a:p>
           <a:p>
             <a:r>
@@ -7052,11 +6380,31 @@
             </a:r>
             <a:r>
               <a:rPr lang="en-US" sz="2000" b="1" dirty="0"/>
-              <a:t>Eclipse IDE for Java EE Developers </a:t>
+              <a:t>Eclipse IDE for Java </a:t>
+            </a:r>
+            <a:r>
+              <a:rPr lang="en-US" sz="2000" b="1" dirty="0"/>
+              <a:t>Developers </a:t>
+            </a:r>
+            <a:r>
+              <a:rPr lang="en-US" sz="2000" dirty="0" smtClean="0"/>
+              <a:t>or </a:t>
+            </a:r>
+            <a:r>
+              <a:rPr lang="en-US" sz="2000" b="1" dirty="0" smtClean="0"/>
+              <a:t>Eclipse </a:t>
+            </a:r>
+            <a:r>
+              <a:rPr lang="en-US" sz="2000" b="1" dirty="0"/>
+              <a:t>IDE for Java EE Developers </a:t>
+            </a:r>
+            <a:r>
+              <a:rPr lang="en-US" sz="2000" dirty="0" smtClean="0"/>
+              <a:t>package from </a:t>
             </a:r>
             <a:r>
               <a:rPr lang="en-US" sz="2000" dirty="0"/>
-              <a:t>package from the following URL. </a:t>
+              <a:t>the following URL. </a:t>
             </a:r>
             <a:r>
               <a:rPr lang="en-US" sz="2000" dirty="0" smtClean="0"/>
@@ -7895,13 +7243,8 @@
             </a:pPr>
             <a:r>
               <a:rPr lang="en-US" sz="2000" dirty="0" smtClean="0"/>
-              <a:t>Open a browser and </a:t>
-            </a:r>
-            <a:r>
-              <a:rPr lang="en-US" sz="2000" dirty="0" smtClean="0"/>
-              <a:t>visit:</a:t>
-            </a:r>
-            <a:endParaRPr lang="en-US" sz="2000" dirty="0" smtClean="0"/>
+              <a:t>Open a browser and visit:</a:t>
+            </a:r>
           </a:p>
           <a:p>
             <a:pPr marL="400050">

</xml_diff>

<commit_message>
Uppdaterat baserat på feedback från genrep.
</commit_message>
<xml_diff>
--- a/docs/groovy-tdd-installation.pptx
+++ b/docs/groovy-tdd-installation.pptx
@@ -7,6 +7,9 @@
   <p:notesMasterIdLst>
     <p:notesMasterId r:id="rId15"/>
   </p:notesMasterIdLst>
+  <p:handoutMasterIdLst>
+    <p:handoutMasterId r:id="rId16"/>
+  </p:handoutMasterIdLst>
   <p:sldIdLst>
     <p:sldId id="256" r:id="rId2"/>
     <p:sldId id="257" r:id="rId3"/>
@@ -161,6 +164,235 @@
 </p:presentation>
 </file>
 
+<file path=ppt/handoutMasters/handoutMaster1.xml><?xml version="1.0" encoding="utf-8"?>
+<p:handoutMaster xmlns:a="http://schemas.openxmlformats.org/drawingml/2006/main" xmlns:r="http://schemas.openxmlformats.org/officeDocument/2006/relationships" xmlns:p="http://schemas.openxmlformats.org/presentationml/2006/main">
+  <p:cSld>
+    <p:bg>
+      <p:bgPr>
+        <a:solidFill>
+          <a:schemeClr val="bg1"/>
+        </a:solidFill>
+        <a:effectLst/>
+      </p:bgPr>
+    </p:bg>
+    <p:spTree>
+      <p:nvGrpSpPr>
+        <p:cNvPr id="1" name=""/>
+        <p:cNvGrpSpPr/>
+        <p:nvPr/>
+      </p:nvGrpSpPr>
+      <p:grpSpPr>
+        <a:xfrm>
+          <a:off x="0" y="0"/>
+          <a:ext cx="0" cy="0"/>
+          <a:chOff x="0" y="0"/>
+          <a:chExt cx="0" cy="0"/>
+        </a:xfrm>
+      </p:grpSpPr>
+      <p:sp>
+        <p:nvSpPr>
+          <p:cNvPr id="36866" name="Rectangle 2"/>
+          <p:cNvSpPr>
+            <a:spLocks noGrp="1" noChangeArrowheads="1"/>
+          </p:cNvSpPr>
+          <p:nvPr>
+            <p:ph type="hdr" sz="quarter"/>
+          </p:nvPr>
+        </p:nvSpPr>
+        <p:spPr bwMode="auto">
+          <a:xfrm>
+            <a:off x="0" y="0"/>
+            <a:ext cx="3170238" cy="479425"/>
+          </a:xfrm>
+          <a:prstGeom prst="rect">
+            <a:avLst/>
+          </a:prstGeom>
+          <a:noFill/>
+          <a:ln w="9525">
+            <a:noFill/>
+            <a:miter lim="800000"/>
+            <a:headEnd/>
+            <a:tailEnd/>
+          </a:ln>
+          <a:effectLst/>
+        </p:spPr>
+        <p:txBody>
+          <a:bodyPr vert="horz" wrap="square" lIns="91440" tIns="45720" rIns="91440" bIns="45720" numCol="1" anchor="t" anchorCtr="0" compatLnSpc="1">
+            <a:prstTxWarp prst="textNoShape">
+              <a:avLst/>
+            </a:prstTxWarp>
+          </a:bodyPr>
+          <a:lstStyle>
+            <a:lvl1pPr>
+              <a:defRPr sz="1200"/>
+            </a:lvl1pPr>
+          </a:lstStyle>
+          <a:p>
+            <a:pPr>
+              <a:defRPr/>
+            </a:pPr>
+            <a:endParaRPr lang="en-US"/>
+          </a:p>
+        </p:txBody>
+      </p:sp>
+      <p:sp>
+        <p:nvSpPr>
+          <p:cNvPr id="36867" name="Rectangle 3"/>
+          <p:cNvSpPr>
+            <a:spLocks noGrp="1" noChangeArrowheads="1"/>
+          </p:cNvSpPr>
+          <p:nvPr>
+            <p:ph type="dt" sz="quarter" idx="1"/>
+          </p:nvPr>
+        </p:nvSpPr>
+        <p:spPr bwMode="auto">
+          <a:xfrm>
+            <a:off x="4143375" y="0"/>
+            <a:ext cx="3170238" cy="479425"/>
+          </a:xfrm>
+          <a:prstGeom prst="rect">
+            <a:avLst/>
+          </a:prstGeom>
+          <a:noFill/>
+          <a:ln w="9525">
+            <a:noFill/>
+            <a:miter lim="800000"/>
+            <a:headEnd/>
+            <a:tailEnd/>
+          </a:ln>
+          <a:effectLst/>
+        </p:spPr>
+        <p:txBody>
+          <a:bodyPr vert="horz" wrap="square" lIns="91440" tIns="45720" rIns="91440" bIns="45720" numCol="1" anchor="t" anchorCtr="0" compatLnSpc="1">
+            <a:prstTxWarp prst="textNoShape">
+              <a:avLst/>
+            </a:prstTxWarp>
+          </a:bodyPr>
+          <a:lstStyle>
+            <a:lvl1pPr algn="r">
+              <a:defRPr sz="1200"/>
+            </a:lvl1pPr>
+          </a:lstStyle>
+          <a:p>
+            <a:pPr>
+              <a:defRPr/>
+            </a:pPr>
+            <a:fld id="{7ABD0E3B-E301-4B35-AA32-91A0F8EF0421}" type="datetimeFigureOut">
+              <a:rPr lang="en-US"/>
+              <a:pPr>
+                <a:defRPr/>
+              </a:pPr>
+              <a:t>1/24/2015</a:t>
+            </a:fld>
+            <a:endParaRPr lang="en-US"/>
+          </a:p>
+        </p:txBody>
+      </p:sp>
+      <p:sp>
+        <p:nvSpPr>
+          <p:cNvPr id="36868" name="Rectangle 4"/>
+          <p:cNvSpPr>
+            <a:spLocks noGrp="1" noChangeArrowheads="1"/>
+          </p:cNvSpPr>
+          <p:nvPr>
+            <p:ph type="ftr" sz="quarter" idx="2"/>
+          </p:nvPr>
+        </p:nvSpPr>
+        <p:spPr bwMode="auto">
+          <a:xfrm>
+            <a:off x="0" y="9120188"/>
+            <a:ext cx="3170238" cy="479425"/>
+          </a:xfrm>
+          <a:prstGeom prst="rect">
+            <a:avLst/>
+          </a:prstGeom>
+          <a:noFill/>
+          <a:ln w="9525">
+            <a:noFill/>
+            <a:miter lim="800000"/>
+            <a:headEnd/>
+            <a:tailEnd/>
+          </a:ln>
+          <a:effectLst/>
+        </p:spPr>
+        <p:txBody>
+          <a:bodyPr vert="horz" wrap="square" lIns="91440" tIns="45720" rIns="91440" bIns="45720" numCol="1" anchor="b" anchorCtr="0" compatLnSpc="1">
+            <a:prstTxWarp prst="textNoShape">
+              <a:avLst/>
+            </a:prstTxWarp>
+          </a:bodyPr>
+          <a:lstStyle>
+            <a:lvl1pPr>
+              <a:defRPr sz="1200"/>
+            </a:lvl1pPr>
+          </a:lstStyle>
+          <a:p>
+            <a:pPr>
+              <a:defRPr/>
+            </a:pPr>
+            <a:endParaRPr lang="en-US"/>
+          </a:p>
+        </p:txBody>
+      </p:sp>
+      <p:sp>
+        <p:nvSpPr>
+          <p:cNvPr id="36869" name="Rectangle 5"/>
+          <p:cNvSpPr>
+            <a:spLocks noGrp="1" noChangeArrowheads="1"/>
+          </p:cNvSpPr>
+          <p:nvPr>
+            <p:ph type="sldNum" sz="quarter" idx="3"/>
+          </p:nvPr>
+        </p:nvSpPr>
+        <p:spPr bwMode="auto">
+          <a:xfrm>
+            <a:off x="4143375" y="9120188"/>
+            <a:ext cx="3170238" cy="479425"/>
+          </a:xfrm>
+          <a:prstGeom prst="rect">
+            <a:avLst/>
+          </a:prstGeom>
+          <a:noFill/>
+          <a:ln w="9525">
+            <a:noFill/>
+            <a:miter lim="800000"/>
+            <a:headEnd/>
+            <a:tailEnd/>
+          </a:ln>
+          <a:effectLst/>
+        </p:spPr>
+        <p:txBody>
+          <a:bodyPr vert="horz" wrap="square" lIns="91440" tIns="45720" rIns="91440" bIns="45720" numCol="1" anchor="b" anchorCtr="0" compatLnSpc="1">
+            <a:prstTxWarp prst="textNoShape">
+              <a:avLst/>
+            </a:prstTxWarp>
+          </a:bodyPr>
+          <a:lstStyle>
+            <a:lvl1pPr algn="r">
+              <a:defRPr sz="1200"/>
+            </a:lvl1pPr>
+          </a:lstStyle>
+          <a:p>
+            <a:pPr>
+              <a:defRPr/>
+            </a:pPr>
+            <a:fld id="{AE752A54-8270-4289-9CB2-D1E261AFA7D4}" type="slidenum">
+              <a:rPr lang="en-US"/>
+              <a:pPr>
+                <a:defRPr/>
+              </a:pPr>
+              <a:t>‹#›</a:t>
+            </a:fld>
+            <a:endParaRPr lang="en-US"/>
+          </a:p>
+        </p:txBody>
+      </p:sp>
+    </p:spTree>
+  </p:cSld>
+  <p:clrMap bg1="lt1" tx1="dk1" bg2="lt2" tx2="dk2" accent1="accent1" accent2="accent2" accent3="accent3" accent4="accent4" accent5="accent5" accent6="accent6" hlink="hlink" folHlink="folHlink"/>
+</p:handoutMaster>
+</file>
+
 <file path=ppt/notesMasters/notesMaster1.xml><?xml version="1.0" encoding="utf-8"?>
 <p:notesMaster xmlns:a="http://schemas.openxmlformats.org/drawingml/2006/main" xmlns:r="http://schemas.openxmlformats.org/officeDocument/2006/relationships" xmlns:p="http://schemas.openxmlformats.org/presentationml/2006/main">
   <p:cSld>
@@ -285,11 +517,6 @@
         </p:txBody>
       </p:sp>
     </p:spTree>
-    <p:extLst>
-      <p:ext uri="{BB962C8B-B14F-4D97-AF65-F5344CB8AC3E}">
-        <p14:creationId xmlns:p14="http://schemas.microsoft.com/office/powerpoint/2010/main" val="232425920"/>
-      </p:ext>
-    </p:extLst>
   </p:cSld>
   <p:clrMap bg1="lt1" tx1="dk1" bg2="lt2" tx2="dk2" accent1="accent1" accent2="accent2" accent3="accent3" accent4="accent4" accent5="accent5" accent6="accent6" hlink="hlink" folHlink="folHlink"/>
   <p:notesStyle>
@@ -3470,7 +3697,7 @@
               <a:buNone/>
               <a:defRPr/>
             </a:pPr>
-            <a:fld id="{3E1E53BC-DA73-455B-9EE7-476C3513FF5A}" type="slidenum">
+            <a:fld id="{F4D15BD1-6617-42D8-B33D-016D31605DDB}" type="slidenum">
               <a:rPr lang="en-US" sz="1100" smtClean="0">
                 <a:solidFill>
                   <a:schemeClr val="bg1"/>
@@ -3517,7 +3744,7 @@
   <p:hf hdr="0" ftr="0" dt="0"/>
   <p:txStyles>
     <p:titleStyle>
-      <a:lvl1pPr algn="l" defTabSz="457200" rtl="0" fontAlgn="base">
+      <a:lvl1pPr algn="l" defTabSz="457200" rtl="0" eaLnBrk="0" fontAlgn="base" hangingPunct="0">
         <a:spcBef>
           <a:spcPct val="0"/>
         </a:spcBef>
@@ -3533,7 +3760,7 @@
           <a:cs typeface="Cambria Bold"/>
         </a:defRPr>
       </a:lvl1pPr>
-      <a:lvl2pPr algn="l" defTabSz="457200" rtl="0" fontAlgn="base">
+      <a:lvl2pPr algn="l" defTabSz="457200" rtl="0" eaLnBrk="0" fontAlgn="base" hangingPunct="0">
         <a:spcBef>
           <a:spcPct val="0"/>
         </a:spcBef>
@@ -3549,7 +3776,7 @@
           <a:cs typeface="Cambria Bold" pitchFamily="18" charset="0"/>
         </a:defRPr>
       </a:lvl2pPr>
-      <a:lvl3pPr algn="l" defTabSz="457200" rtl="0" fontAlgn="base">
+      <a:lvl3pPr algn="l" defTabSz="457200" rtl="0" eaLnBrk="0" fontAlgn="base" hangingPunct="0">
         <a:spcBef>
           <a:spcPct val="0"/>
         </a:spcBef>
@@ -3565,7 +3792,7 @@
           <a:cs typeface="Cambria Bold" pitchFamily="18" charset="0"/>
         </a:defRPr>
       </a:lvl3pPr>
-      <a:lvl4pPr algn="l" defTabSz="457200" rtl="0" fontAlgn="base">
+      <a:lvl4pPr algn="l" defTabSz="457200" rtl="0" eaLnBrk="0" fontAlgn="base" hangingPunct="0">
         <a:spcBef>
           <a:spcPct val="0"/>
         </a:spcBef>
@@ -3581,7 +3808,7 @@
           <a:cs typeface="Cambria Bold" pitchFamily="18" charset="0"/>
         </a:defRPr>
       </a:lvl4pPr>
-      <a:lvl5pPr algn="l" defTabSz="457200" rtl="0" fontAlgn="base">
+      <a:lvl5pPr algn="l" defTabSz="457200" rtl="0" eaLnBrk="0" fontAlgn="base" hangingPunct="0">
         <a:spcBef>
           <a:spcPct val="0"/>
         </a:spcBef>
@@ -3663,7 +3890,7 @@
       </a:lvl9pPr>
     </p:titleStyle>
     <p:bodyStyle>
-      <a:lvl1pPr marL="342900" indent="-342900" algn="l" defTabSz="457200" rtl="0" fontAlgn="base">
+      <a:lvl1pPr marL="342900" indent="-342900" algn="l" defTabSz="457200" rtl="0" eaLnBrk="0" fontAlgn="base" hangingPunct="0">
         <a:spcBef>
           <a:spcPct val="20000"/>
         </a:spcBef>
@@ -3681,7 +3908,7 @@
           <a:cs typeface="ＭＳ Ｐゴシック" pitchFamily="-111" charset="-128"/>
         </a:defRPr>
       </a:lvl1pPr>
-      <a:lvl2pPr marL="742950" indent="-285750" algn="l" defTabSz="457200" rtl="0" fontAlgn="base">
+      <a:lvl2pPr marL="742950" indent="-285750" algn="l" defTabSz="457200" rtl="0" eaLnBrk="0" fontAlgn="base" hangingPunct="0">
         <a:spcBef>
           <a:spcPct val="20000"/>
         </a:spcBef>
@@ -3699,7 +3926,7 @@
           <a:cs typeface="ＭＳ Ｐゴシック"/>
         </a:defRPr>
       </a:lvl2pPr>
-      <a:lvl3pPr marL="1143000" indent="-228600" algn="l" defTabSz="457200" rtl="0" fontAlgn="base">
+      <a:lvl3pPr marL="1143000" indent="-228600" algn="l" defTabSz="457200" rtl="0" eaLnBrk="0" fontAlgn="base" hangingPunct="0">
         <a:spcBef>
           <a:spcPct val="20000"/>
         </a:spcBef>
@@ -3717,7 +3944,7 @@
           <a:cs typeface="ＭＳ Ｐゴシック"/>
         </a:defRPr>
       </a:lvl3pPr>
-      <a:lvl4pPr marL="1600200" indent="-228600" algn="l" defTabSz="457200" rtl="0" fontAlgn="base">
+      <a:lvl4pPr marL="1600200" indent="-228600" algn="l" defTabSz="457200" rtl="0" eaLnBrk="0" fontAlgn="base" hangingPunct="0">
         <a:spcBef>
           <a:spcPct val="20000"/>
         </a:spcBef>
@@ -3735,7 +3962,7 @@
           <a:cs typeface="ＭＳ Ｐゴシック"/>
         </a:defRPr>
       </a:lvl4pPr>
-      <a:lvl5pPr marL="2057400" indent="-228600" algn="l" defTabSz="457200" rtl="0" fontAlgn="base">
+      <a:lvl5pPr marL="2057400" indent="-228600" algn="l" defTabSz="457200" rtl="0" eaLnBrk="0" fontAlgn="base" hangingPunct="0">
         <a:spcBef>
           <a:spcPct val="20000"/>
         </a:spcBef>
@@ -3932,7 +4159,7 @@
       </p:grpSpPr>
       <p:sp>
         <p:nvSpPr>
-          <p:cNvPr id="13313" name="Title 1"/>
+          <p:cNvPr id="14337" name="Title 1"/>
           <p:cNvSpPr>
             <a:spLocks noGrp="1"/>
           </p:cNvSpPr>
@@ -3960,6 +4187,7 @@
           </a:bodyPr>
           <a:lstStyle/>
           <a:p>
+            <a:pPr eaLnBrk="1" hangingPunct="1"/>
             <a:r>
               <a:rPr lang="en-US" smtClean="0">
                 <a:latin typeface="Cambria" pitchFamily="18" charset="0"/>
@@ -3991,7 +4219,7 @@
           <a:bodyPr/>
           <a:lstStyle/>
           <a:p>
-            <a:pPr>
+            <a:pPr eaLnBrk="1" hangingPunct="1">
               <a:defRPr/>
             </a:pPr>
             <a:r>
@@ -4007,17 +4235,11 @@
           <p:cNvGraphicFramePr>
             <a:graphicFrameLocks noGrp="1"/>
           </p:cNvGraphicFramePr>
-          <p:nvPr>
-            <p:extLst>
-              <p:ext uri="{D42A27DB-BD31-4B8C-83A1-F6EECF244321}">
-                <p14:modId xmlns:p14="http://schemas.microsoft.com/office/powerpoint/2010/main" val="1421915502"/>
-              </p:ext>
-            </p:extLst>
-          </p:nvPr>
+          <p:nvPr/>
         </p:nvGraphicFramePr>
         <p:xfrm>
           <a:off x="827088" y="3522663"/>
-          <a:ext cx="4968552" cy="457200"/>
+          <a:ext cx="4968875" cy="457200"/>
         </p:xfrm>
         <a:graphic>
           <a:graphicData uri="http://schemas.openxmlformats.org/drawingml/2006/table">
@@ -4086,15 +4308,7 @@
                       </a:pPr>
                       <a:r>
                         <a:rPr lang="sv-SE" sz="1000" spc="0" dirty="0" smtClean="0"/>
-                        <a:t>2015-</a:t>
-                      </a:r>
-                      <a:r>
-                        <a:rPr lang="sv-SE" sz="1000" spc="0" dirty="0" smtClean="0"/>
-                        <a:t>01</a:t>
-                      </a:r>
-                      <a:r>
-                        <a:rPr lang="sv-SE" sz="1000" spc="0" dirty="0" smtClean="0"/>
-                        <a:t>-11</a:t>
+                        <a:t>2015-01-11</a:t>
                       </a:r>
                       <a:endParaRPr lang="en-US" sz="1000" spc="0" dirty="0"/>
                     </a:p>
@@ -4220,7 +4434,7 @@
   <p:timing>
     <p:tnLst>
       <p:par>
-        <p:cTn xmlns:p14="http://schemas.microsoft.com/office/powerpoint/2010/main" id="1" dur="indefinite" restart="never" nodeType="tmRoot"/>
+        <p:cTn id="1" dur="indefinite" restart="never" nodeType="tmRoot"/>
       </p:par>
     </p:tnLst>
   </p:timing>
@@ -4254,14 +4468,19 @@
             <p:ph type="ctrTitle"/>
           </p:nvPr>
         </p:nvSpPr>
-        <p:spPr/>
+        <p:spPr>
+          <a:xfrm>
+            <a:off x="685800" y="571500"/>
+            <a:ext cx="7772400" cy="757238"/>
+          </a:xfrm>
+        </p:spPr>
         <p:txBody>
           <a:bodyPr anchor="t">
             <a:normAutofit fontScale="90000"/>
           </a:bodyPr>
           <a:lstStyle/>
           <a:p>
-            <a:pPr>
+            <a:pPr eaLnBrk="1" hangingPunct="1">
               <a:defRPr/>
             </a:pPr>
             <a:r>
@@ -4289,7 +4508,7 @@
       </p:sp>
       <p:sp>
         <p:nvSpPr>
-          <p:cNvPr id="3" name="Text Placeholder 2"/>
+          <p:cNvPr id="23554" name="Text Placeholder 2"/>
           <p:cNvSpPr>
             <a:spLocks noGrp="1"/>
           </p:cNvSpPr>
@@ -4297,7 +4516,18 @@
             <p:ph type="body" sz="quarter" idx="13"/>
           </p:nvPr>
         </p:nvSpPr>
-        <p:spPr/>
+        <p:spPr bwMode="auto">
+          <a:xfrm>
+            <a:off x="685800" y="1557338"/>
+            <a:ext cx="7721600" cy="4679950"/>
+          </a:xfrm>
+          <a:noFill/>
+          <a:ln>
+            <a:miter lim="800000"/>
+            <a:headEnd/>
+            <a:tailEnd/>
+          </a:ln>
+        </p:spPr>
         <p:txBody>
           <a:bodyPr vert="horz" wrap="square" lIns="91440" tIns="45720" rIns="91440" bIns="45720" numCol="1" anchor="t" anchorCtr="0" compatLnSpc="1">
             <a:prstTxWarp prst="textNoShape">
@@ -4306,7 +4536,7 @@
           </a:bodyPr>
           <a:lstStyle/>
           <a:p>
-            <a:pPr marL="57150" indent="0">
+            <a:pPr marL="57150" indent="0" eaLnBrk="1" hangingPunct="1">
               <a:lnSpc>
                 <a:spcPct val="90000"/>
               </a:lnSpc>
@@ -4350,7 +4580,7 @@
             </a:r>
           </a:p>
           <a:p>
-            <a:pPr marL="57150" indent="0">
+            <a:pPr marL="57150" indent="0" eaLnBrk="1" hangingPunct="1">
               <a:lnSpc>
                 <a:spcPct val="90000"/>
               </a:lnSpc>
@@ -4363,7 +4593,7 @@
             </a:endParaRPr>
           </a:p>
           <a:p>
-            <a:pPr marL="57150" indent="0">
+            <a:pPr marL="57150" indent="0" eaLnBrk="1" hangingPunct="1">
               <a:lnSpc>
                 <a:spcPct val="90000"/>
               </a:lnSpc>
@@ -4377,7 +4607,7 @@
             </a:r>
           </a:p>
           <a:p>
-            <a:pPr marL="57150" indent="0">
+            <a:pPr marL="57150" indent="0" eaLnBrk="1" hangingPunct="1">
               <a:lnSpc>
                 <a:spcPct val="90000"/>
               </a:lnSpc>
@@ -4391,7 +4621,7 @@
             </a:r>
           </a:p>
           <a:p>
-            <a:pPr marL="57150" indent="0">
+            <a:pPr marL="57150" indent="0" eaLnBrk="1" hangingPunct="1">
               <a:lnSpc>
                 <a:spcPct val="90000"/>
               </a:lnSpc>
@@ -4402,7 +4632,7 @@
             </a:endParaRPr>
           </a:p>
           <a:p>
-            <a:pPr marL="857250" lvl="1" indent="-342900">
+            <a:pPr marL="857250" lvl="1" indent="-342900" eaLnBrk="1" hangingPunct="1">
               <a:lnSpc>
                 <a:spcPct val="90000"/>
               </a:lnSpc>
@@ -4414,14 +4644,14 @@
                 <a:ea typeface="ＭＳ Ｐゴシック"/>
                 <a:sym typeface="Arial" charset="0"/>
               </a:rPr>
-              <a:t>http://download.eclipse.org/technology/m2e/releases</a:t>
+              <a:t>download.eclipse.org/technology/m2e/releases</a:t>
             </a:r>
             <a:endParaRPr lang="en-US" sz="1800" smtClean="0">
               <a:ea typeface="ＭＳ Ｐゴシック"/>
             </a:endParaRPr>
           </a:p>
           <a:p>
-            <a:pPr marL="57150" indent="0">
+            <a:pPr marL="57150" indent="0" eaLnBrk="1" hangingPunct="1">
               <a:lnSpc>
                 <a:spcPct val="90000"/>
               </a:lnSpc>
@@ -4432,7 +4662,7 @@
             </a:endParaRPr>
           </a:p>
           <a:p>
-            <a:pPr marL="57150" indent="0">
+            <a:pPr marL="57150" indent="0" eaLnBrk="1" hangingPunct="1">
               <a:lnSpc>
                 <a:spcPct val="90000"/>
               </a:lnSpc>
@@ -4446,7 +4676,7 @@
             </a:r>
           </a:p>
           <a:p>
-            <a:pPr marL="857250" lvl="1" indent="-342900">
+            <a:pPr marL="857250" lvl="1" indent="-342900" eaLnBrk="1" hangingPunct="1">
               <a:lnSpc>
                 <a:spcPct val="90000"/>
               </a:lnSpc>
@@ -4461,7 +4691,7 @@
             </a:r>
           </a:p>
           <a:p>
-            <a:pPr marL="1314450" lvl="2" indent="-342900">
+            <a:pPr marL="1314450" lvl="2" indent="-342900" eaLnBrk="1" hangingPunct="1">
               <a:lnSpc>
                 <a:spcPct val="90000"/>
               </a:lnSpc>
@@ -4476,7 +4706,7 @@
             </a:r>
           </a:p>
           <a:p>
-            <a:pPr marL="1314450" lvl="2" indent="-342900">
+            <a:pPr marL="1314450" lvl="2" indent="-342900" eaLnBrk="1" hangingPunct="1">
               <a:lnSpc>
                 <a:spcPct val="90000"/>
               </a:lnSpc>
@@ -4491,7 +4721,7 @@
             </a:r>
           </a:p>
           <a:p>
-            <a:pPr marL="1314450" lvl="2" indent="-342900">
+            <a:pPr marL="1314450" lvl="2" indent="-342900" eaLnBrk="1" hangingPunct="1">
               <a:lnSpc>
                 <a:spcPct val="90000"/>
               </a:lnSpc>
@@ -4509,7 +4739,7 @@
   <p:clrMapOvr>
     <a:masterClrMapping/>
   </p:clrMapOvr>
-  <p:transition xmlns:p14="http://schemas.microsoft.com/office/powerpoint/2010/main" spd="slow"/>
+  <p:transition spd="slow"/>
 </p:sld>
 </file>
 
@@ -4532,7 +4762,7 @@
       </p:grpSpPr>
       <p:sp>
         <p:nvSpPr>
-          <p:cNvPr id="23553" name="Title 1"/>
+          <p:cNvPr id="24577" name="Title 1"/>
           <p:cNvSpPr>
             <a:spLocks noGrp="1"/>
           </p:cNvSpPr>
@@ -4541,6 +4771,10 @@
           </p:nvPr>
         </p:nvSpPr>
         <p:spPr bwMode="auto">
+          <a:xfrm>
+            <a:off x="685800" y="571500"/>
+            <a:ext cx="7772400" cy="757238"/>
+          </a:xfrm>
           <a:noFill/>
           <a:ln>
             <a:miter lim="800000"/>
@@ -4556,6 +4790,7 @@
           </a:bodyPr>
           <a:lstStyle/>
           <a:p>
+            <a:pPr eaLnBrk="1" hangingPunct="1"/>
             <a:r>
               <a:rPr lang="en-US" smtClean="0">
                 <a:latin typeface="Cambria" pitchFamily="18" charset="0"/>
@@ -4569,7 +4804,7 @@
       </p:sp>
       <p:sp>
         <p:nvSpPr>
-          <p:cNvPr id="23554" name="Text Placeholder 2"/>
+          <p:cNvPr id="24578" name="Text Placeholder 2"/>
           <p:cNvSpPr>
             <a:spLocks noGrp="1"/>
           </p:cNvSpPr>
@@ -4578,6 +4813,10 @@
           </p:nvPr>
         </p:nvSpPr>
         <p:spPr bwMode="auto">
+          <a:xfrm>
+            <a:off x="685800" y="1557338"/>
+            <a:ext cx="8350250" cy="4679950"/>
+          </a:xfrm>
           <a:noFill/>
           <a:ln>
             <a:miter lim="800000"/>
@@ -4593,6 +4832,7 @@
           </a:bodyPr>
           <a:lstStyle/>
           <a:p>
+            <a:pPr eaLnBrk="1" hangingPunct="1"/>
             <a:r>
               <a:rPr lang="en-US" sz="2000" smtClean="0">
                 <a:ea typeface="ＭＳ Ｐゴシック"/>
@@ -4602,25 +4842,27 @@
             </a:r>
           </a:p>
           <a:p>
+            <a:pPr eaLnBrk="1" hangingPunct="1"/>
+            <a:endParaRPr lang="sv-SE" sz="2000" smtClean="0">
+              <a:ea typeface="ＭＳ Ｐゴシック"/>
+              <a:cs typeface="ＭＳ Ｐゴシック"/>
+            </a:endParaRPr>
+          </a:p>
+          <a:p>
+            <a:pPr eaLnBrk="1" hangingPunct="1"/>
             <a:endParaRPr lang="en-US" sz="2000" smtClean="0">
               <a:ea typeface="ＭＳ Ｐゴシック"/>
               <a:cs typeface="ＭＳ Ｐゴシック"/>
             </a:endParaRPr>
           </a:p>
           <a:p>
-            <a:endParaRPr lang="en-US" sz="2000" smtClean="0">
-              <a:ea typeface="ＭＳ Ｐゴシック"/>
-              <a:cs typeface="ＭＳ Ｐゴシック"/>
-            </a:endParaRPr>
-          </a:p>
-          <a:p>
-            <a:pPr lvl="1"/>
+            <a:pPr marL="457200" lvl="1" indent="0" eaLnBrk="1" hangingPunct="1"/>
             <a:endParaRPr lang="en-US" sz="2000" smtClean="0">
               <a:ea typeface="ＭＳ Ｐゴシック"/>
             </a:endParaRPr>
           </a:p>
           <a:p>
-            <a:pPr lvl="1"/>
+            <a:pPr marL="457200" lvl="1" indent="0" eaLnBrk="1" hangingPunct="1"/>
             <a:r>
               <a:rPr lang="en-US" sz="1800" smtClean="0">
                 <a:ea typeface="ＭＳ Ｐゴシック"/>
@@ -4629,6 +4871,7 @@
             </a:r>
           </a:p>
           <a:p>
+            <a:pPr eaLnBrk="1" hangingPunct="1"/>
             <a:r>
               <a:rPr lang="en-US" sz="2000" smtClean="0">
                 <a:ea typeface="ＭＳ Ｐゴシック"/>
@@ -4638,6 +4881,7 @@
             </a:r>
           </a:p>
           <a:p>
+            <a:pPr eaLnBrk="1" hangingPunct="1"/>
             <a:r>
               <a:rPr lang="en-US" sz="2000" smtClean="0">
                 <a:ea typeface="ＭＳ Ｐゴシック"/>
@@ -4647,7 +4891,7 @@
             </a:r>
           </a:p>
           <a:p>
-            <a:pPr lvl="1"/>
+            <a:pPr marL="457200" lvl="1" indent="0" eaLnBrk="1" hangingPunct="1"/>
             <a:r>
               <a:rPr lang="en-US" sz="1800" smtClean="0">
                 <a:ea typeface="ＭＳ Ｐゴシック"/>
@@ -4656,7 +4900,7 @@
             </a:r>
           </a:p>
           <a:p>
-            <a:pPr lvl="1"/>
+            <a:pPr marL="457200" lvl="1" indent="0" eaLnBrk="1" hangingPunct="1"/>
             <a:r>
               <a:rPr lang="en-US" sz="1800" smtClean="0">
                 <a:ea typeface="ＭＳ Ｐゴシック"/>
@@ -4665,7 +4909,7 @@
             </a:r>
           </a:p>
           <a:p>
-            <a:pPr lvl="1"/>
+            <a:pPr marL="457200" lvl="1" indent="0" eaLnBrk="1" hangingPunct="1"/>
             <a:r>
               <a:rPr lang="en-US" sz="1800" smtClean="0">
                 <a:ea typeface="ＭＳ Ｐゴシック"/>
@@ -4686,7 +4930,7 @@
             </a:r>
           </a:p>
           <a:p>
-            <a:pPr lvl="1"/>
+            <a:pPr marL="457200" lvl="1" indent="0" eaLnBrk="1" hangingPunct="1"/>
             <a:r>
               <a:rPr lang="en-US" sz="1800" smtClean="0">
                 <a:ea typeface="ＭＳ Ｐゴシック"/>
@@ -4695,6 +4939,7 @@
             </a:r>
           </a:p>
           <a:p>
+            <a:pPr eaLnBrk="1" hangingPunct="1"/>
             <a:endParaRPr lang="en-US" sz="2000" smtClean="0">
               <a:ea typeface="ＭＳ Ｐゴシック"/>
               <a:cs typeface="ＭＳ Ｐゴシック"/>
@@ -4712,8 +4957,8 @@
         </p:nvSpPr>
         <p:spPr>
           <a:xfrm>
-            <a:off x="1116013" y="2060575"/>
-            <a:ext cx="6048375" cy="809625"/>
+            <a:off x="900113" y="2205038"/>
+            <a:ext cx="7993062" cy="576262"/>
           </a:xfrm>
           <a:prstGeom prst="roundRect">
             <a:avLst/>
@@ -4741,177 +4986,29 @@
         </p:spPr>
         <p:txBody>
           <a:bodyPr anchor="ctr"/>
-          <a:lstStyle>
-            <a:lvl1pPr marL="342900" indent="-342900" algn="l" defTabSz="457200" rtl="0" eaLnBrk="1" fontAlgn="base" hangingPunct="1">
+          <a:lstStyle/>
+          <a:p>
+            <a:pPr defTabSz="457200">
               <a:spcBef>
                 <a:spcPct val="20000"/>
               </a:spcBef>
-              <a:spcAft>
-                <a:spcPct val="0"/>
-              </a:spcAft>
-              <a:buFont typeface="Arial" charset="0"/>
-              <a:buChar char="•"/>
-              <a:defRPr sz="2400" kern="1200">
-                <a:solidFill>
-                  <a:schemeClr val="tx1"/>
-                </a:solidFill>
-                <a:latin typeface="+mn-lt"/>
-                <a:ea typeface="ＭＳ Ｐゴシック" pitchFamily="-111" charset="-128"/>
-                <a:cs typeface="ＭＳ Ｐゴシック" pitchFamily="-111" charset="-128"/>
-              </a:defRPr>
-            </a:lvl1pPr>
-            <a:lvl2pPr marL="742950" indent="-285750" algn="l" defTabSz="457200" rtl="0" eaLnBrk="1" fontAlgn="base" hangingPunct="1">
-              <a:spcBef>
-                <a:spcPct val="20000"/>
-              </a:spcBef>
-              <a:spcAft>
-                <a:spcPct val="0"/>
-              </a:spcAft>
-              <a:buFont typeface="Arial" charset="0"/>
-              <a:buChar char="–"/>
-              <a:defRPr sz="2200" kern="1200">
-                <a:solidFill>
-                  <a:schemeClr val="tx1"/>
-                </a:solidFill>
-                <a:latin typeface="+mn-lt"/>
-                <a:ea typeface="ＭＳ Ｐゴシック" pitchFamily="-111" charset="-128"/>
-                <a:cs typeface="ＭＳ Ｐゴシック"/>
-              </a:defRPr>
-            </a:lvl2pPr>
-            <a:lvl3pPr marL="1143000" indent="-228600" algn="l" defTabSz="457200" rtl="0" eaLnBrk="1" fontAlgn="base" hangingPunct="1">
-              <a:spcBef>
-                <a:spcPct val="20000"/>
-              </a:spcBef>
-              <a:spcAft>
-                <a:spcPct val="0"/>
-              </a:spcAft>
-              <a:buFont typeface="Calibri" pitchFamily="34" charset="0"/>
-              <a:buChar char="»"/>
-              <a:defRPr sz="2000" kern="1200">
-                <a:solidFill>
-                  <a:schemeClr val="tx1"/>
-                </a:solidFill>
-                <a:latin typeface="+mn-lt"/>
-                <a:ea typeface="ＭＳ Ｐゴシック" pitchFamily="-111" charset="-128"/>
-                <a:cs typeface="ＭＳ Ｐゴシック"/>
-              </a:defRPr>
-            </a:lvl3pPr>
-            <a:lvl4pPr marL="1600200" indent="-228600" algn="l" defTabSz="457200" rtl="0" eaLnBrk="1" fontAlgn="base" hangingPunct="1">
-              <a:spcBef>
-                <a:spcPct val="20000"/>
-              </a:spcBef>
-              <a:spcAft>
-                <a:spcPct val="0"/>
-              </a:spcAft>
-              <a:buFont typeface="Arial" charset="0"/>
-              <a:buChar char="–"/>
-              <a:defRPr sz="1800" kern="1200">
-                <a:solidFill>
-                  <a:schemeClr val="tx1">
-                    <a:lumMod val="75000"/>
-                    <a:lumOff val="25000"/>
-                  </a:schemeClr>
-                </a:solidFill>
-                <a:latin typeface="+mn-lt"/>
-                <a:ea typeface="ＭＳ Ｐゴシック" pitchFamily="-111" charset="-128"/>
-                <a:cs typeface="ＭＳ Ｐゴシック"/>
-              </a:defRPr>
-            </a:lvl4pPr>
-            <a:lvl5pPr marL="2057400" indent="-228600" algn="l" defTabSz="457200" rtl="0" eaLnBrk="1" fontAlgn="base" hangingPunct="1">
-              <a:spcBef>
-                <a:spcPct val="20000"/>
-              </a:spcBef>
-              <a:spcAft>
-                <a:spcPct val="0"/>
-              </a:spcAft>
-              <a:buFont typeface="Arial" charset="0"/>
-              <a:buChar char="»"/>
-              <a:defRPr sz="1800" kern="1200">
-                <a:solidFill>
-                  <a:schemeClr val="tx1">
-                    <a:lumMod val="75000"/>
-                    <a:lumOff val="25000"/>
-                  </a:schemeClr>
-                </a:solidFill>
-                <a:latin typeface="+mn-lt"/>
-                <a:ea typeface="ＭＳ Ｐゴシック" pitchFamily="-111" charset="-128"/>
-                <a:cs typeface="ＭＳ Ｐゴシック"/>
-              </a:defRPr>
-            </a:lvl5pPr>
-            <a:lvl6pPr marL="2514600" indent="-228600" algn="l" defTabSz="457200" rtl="0" eaLnBrk="1" latinLnBrk="0" hangingPunct="1">
-              <a:spcBef>
-                <a:spcPct val="20000"/>
-              </a:spcBef>
-              <a:buFont typeface="Arial"/>
-              <a:buChar char="•"/>
-              <a:defRPr sz="2000" kern="1200">
-                <a:solidFill>
-                  <a:schemeClr val="tx1"/>
-                </a:solidFill>
-                <a:latin typeface="+mn-lt"/>
-                <a:ea typeface="+mn-ea"/>
-                <a:cs typeface="+mn-cs"/>
-              </a:defRPr>
-            </a:lvl6pPr>
-            <a:lvl7pPr marL="2971800" indent="-228600" algn="l" defTabSz="457200" rtl="0" eaLnBrk="1" latinLnBrk="0" hangingPunct="1">
-              <a:spcBef>
-                <a:spcPct val="20000"/>
-              </a:spcBef>
-              <a:buFont typeface="Arial"/>
-              <a:buChar char="•"/>
-              <a:defRPr sz="2000" kern="1200">
-                <a:solidFill>
-                  <a:schemeClr val="tx1"/>
-                </a:solidFill>
-                <a:latin typeface="+mn-lt"/>
-                <a:ea typeface="+mn-ea"/>
-                <a:cs typeface="+mn-cs"/>
-              </a:defRPr>
-            </a:lvl7pPr>
-            <a:lvl8pPr marL="3429000" indent="-228600" algn="l" defTabSz="457200" rtl="0" eaLnBrk="1" latinLnBrk="0" hangingPunct="1">
-              <a:spcBef>
-                <a:spcPct val="20000"/>
-              </a:spcBef>
-              <a:buFont typeface="Arial"/>
-              <a:buChar char="•"/>
-              <a:defRPr sz="2000" kern="1200">
-                <a:solidFill>
-                  <a:schemeClr val="tx1"/>
-                </a:solidFill>
-                <a:latin typeface="+mn-lt"/>
-                <a:ea typeface="+mn-ea"/>
-                <a:cs typeface="+mn-cs"/>
-              </a:defRPr>
-            </a:lvl8pPr>
-            <a:lvl9pPr marL="3886200" indent="-228600" algn="l" defTabSz="457200" rtl="0" eaLnBrk="1" latinLnBrk="0" hangingPunct="1">
-              <a:spcBef>
-                <a:spcPct val="20000"/>
-              </a:spcBef>
-              <a:buFont typeface="Arial"/>
-              <a:buChar char="•"/>
-              <a:defRPr sz="2000" kern="1200">
-                <a:solidFill>
-                  <a:schemeClr val="tx1"/>
-                </a:solidFill>
-                <a:latin typeface="+mn-lt"/>
-                <a:ea typeface="+mn-ea"/>
-                <a:cs typeface="+mn-cs"/>
-              </a:defRPr>
-            </a:lvl9pPr>
-          </a:lstStyle>
-          <a:p>
-            <a:pPr marL="0" lvl="1" indent="0">
               <a:buFont typeface="Arial" charset="0"/>
               <a:buNone/>
-              <a:defRPr/>
             </a:pPr>
             <a:r>
-              <a:rPr lang="en-US" sz="2000" dirty="0" smtClean="0">
+              <a:rPr lang="sv-SE" sz="1400">
+                <a:solidFill>
+                  <a:schemeClr val="tx1"/>
+                </a:solidFill>
                 <a:hlinkClick r:id="rId2"/>
               </a:rPr>
-              <a:t>https://callistaenterprise.atlassian.net/wiki/download/attachments/12288001/groovy-tdd-cadec.zip</a:t>
-            </a:r>
-            <a:endParaRPr lang="en-US" sz="2000" dirty="0"/>
+              <a:t>http://callistaenterprise.atlassian.net/wiki/download/attachments/12288001/groovy-tdd-cadec.zip</a:t>
+            </a:r>
+            <a:endParaRPr lang="sv-SE" sz="1400">
+              <a:solidFill>
+                <a:schemeClr val="tx1"/>
+              </a:solidFill>
+            </a:endParaRPr>
           </a:p>
         </p:txBody>
       </p:sp>
@@ -4950,14 +5047,19 @@
             <p:ph type="ctrTitle"/>
           </p:nvPr>
         </p:nvSpPr>
-        <p:spPr/>
+        <p:spPr>
+          <a:xfrm>
+            <a:off x="685800" y="571500"/>
+            <a:ext cx="7772400" cy="757238"/>
+          </a:xfrm>
+        </p:spPr>
         <p:txBody>
           <a:bodyPr anchor="t">
             <a:normAutofit fontScale="90000"/>
           </a:bodyPr>
           <a:lstStyle/>
           <a:p>
-            <a:pPr>
+            <a:pPr eaLnBrk="1" hangingPunct="1">
               <a:defRPr/>
             </a:pPr>
             <a:r>
@@ -4988,12 +5090,17 @@
             <p:ph type="body" sz="quarter" idx="13"/>
           </p:nvPr>
         </p:nvSpPr>
-        <p:spPr/>
+        <p:spPr>
+          <a:xfrm>
+            <a:off x="685800" y="1557338"/>
+            <a:ext cx="7721600" cy="4679950"/>
+          </a:xfrm>
+        </p:spPr>
         <p:txBody>
           <a:bodyPr/>
           <a:lstStyle/>
           <a:p>
-            <a:pPr marL="0" indent="0">
+            <a:pPr marL="0" indent="0" eaLnBrk="1" hangingPunct="1">
               <a:buFont typeface="Arial" charset="0"/>
               <a:buNone/>
               <a:defRPr/>
@@ -5012,7 +5119,7 @@
             </a:r>
           </a:p>
           <a:p>
-            <a:pPr marL="457200" indent="-457200">
+            <a:pPr marL="457200" indent="-457200" eaLnBrk="1" hangingPunct="1">
               <a:buFont typeface="+mj-lt"/>
               <a:buAutoNum type="arabicPeriod"/>
               <a:defRPr/>
@@ -5044,7 +5151,7 @@
             <a:endParaRPr lang="en-US" sz="1800" dirty="0" smtClean="0"/>
           </a:p>
           <a:p>
-            <a:pPr marL="457200" indent="-457200">
+            <a:pPr marL="457200" indent="-457200" eaLnBrk="1" hangingPunct="1">
               <a:buFont typeface="+mj-lt"/>
               <a:buAutoNum type="arabicPeriod"/>
               <a:defRPr/>
@@ -5065,7 +5172,7 @@
             </a:r>
           </a:p>
           <a:p>
-            <a:pPr marL="457200" indent="-457200">
+            <a:pPr marL="457200" indent="-457200" eaLnBrk="1" hangingPunct="1">
               <a:buFont typeface="+mj-lt"/>
               <a:buAutoNum type="arabicPeriod"/>
               <a:defRPr/>
@@ -5090,7 +5197,7 @@
       </p:sp>
       <p:pic>
         <p:nvPicPr>
-          <p:cNvPr id="24579" name="Picture 4"/>
+          <p:cNvPr id="25603" name="Picture 4"/>
           <p:cNvPicPr>
             <a:picLocks noChangeAspect="1"/>
           </p:cNvPicPr>
@@ -5155,14 +5262,19 @@
             <p:ph type="ctrTitle"/>
           </p:nvPr>
         </p:nvSpPr>
-        <p:spPr/>
+        <p:spPr>
+          <a:xfrm>
+            <a:off x="685800" y="571500"/>
+            <a:ext cx="7772400" cy="757238"/>
+          </a:xfrm>
+        </p:spPr>
         <p:txBody>
           <a:bodyPr anchor="t">
             <a:normAutofit fontScale="90000"/>
           </a:bodyPr>
           <a:lstStyle/>
           <a:p>
-            <a:pPr>
+            <a:pPr eaLnBrk="1" hangingPunct="1">
               <a:defRPr/>
             </a:pPr>
             <a:r>
@@ -5190,12 +5302,17 @@
             <p:ph type="body" sz="quarter" idx="13"/>
           </p:nvPr>
         </p:nvSpPr>
-        <p:spPr/>
+        <p:spPr>
+          <a:xfrm>
+            <a:off x="685800" y="1557338"/>
+            <a:ext cx="7721600" cy="4679950"/>
+          </a:xfrm>
+        </p:spPr>
         <p:txBody>
           <a:bodyPr/>
           <a:lstStyle/>
           <a:p>
-            <a:pPr marL="457200" indent="-457200">
+            <a:pPr marL="457200" indent="-457200" eaLnBrk="1" hangingPunct="1">
               <a:buFont typeface="+mj-lt"/>
               <a:buAutoNum type="arabicPeriod"/>
               <a:defRPr/>
@@ -5235,7 +5352,7 @@
             <a:endParaRPr lang="en-US" sz="2000" dirty="0" smtClean="0"/>
           </a:p>
           <a:p>
-            <a:pPr marL="457200" indent="-457200">
+            <a:pPr marL="457200" indent="-457200" eaLnBrk="1" hangingPunct="1">
               <a:buFont typeface="+mj-lt"/>
               <a:buAutoNum type="arabicPeriod"/>
               <a:defRPr/>
@@ -5271,7 +5388,7 @@
             <a:endParaRPr lang="en-US" sz="2000" dirty="0" smtClean="0"/>
           </a:p>
           <a:p>
-            <a:pPr marL="457200" indent="-457200">
+            <a:pPr marL="457200" indent="-457200" eaLnBrk="1" hangingPunct="1">
               <a:buFont typeface="+mj-lt"/>
               <a:buAutoNum type="arabicPeriod"/>
               <a:defRPr/>
@@ -5287,7 +5404,7 @@
             <a:endParaRPr lang="en-US" sz="2000" dirty="0" smtClean="0"/>
           </a:p>
           <a:p>
-            <a:pPr marL="0" indent="0">
+            <a:pPr marL="0" indent="0" eaLnBrk="1" hangingPunct="1">
               <a:buFont typeface="Arial" charset="0"/>
               <a:buNone/>
               <a:defRPr/>
@@ -5335,189 +5452,32 @@
         </p:spPr>
         <p:txBody>
           <a:bodyPr anchor="ctr"/>
-          <a:lstStyle>
-            <a:lvl1pPr marL="342900" indent="-342900" algn="l" defTabSz="457200" rtl="0" eaLnBrk="1" fontAlgn="base" hangingPunct="1">
+          <a:lstStyle/>
+          <a:p>
+            <a:pPr marL="0" lvl="1" defTabSz="457200">
               <a:spcBef>
                 <a:spcPct val="20000"/>
               </a:spcBef>
-              <a:spcAft>
-                <a:spcPct val="0"/>
-              </a:spcAft>
-              <a:buFont typeface="Arial" charset="0"/>
-              <a:buChar char="•"/>
-              <a:defRPr sz="2400" kern="1200">
-                <a:solidFill>
-                  <a:schemeClr val="tx1"/>
-                </a:solidFill>
-                <a:latin typeface="+mn-lt"/>
-                <a:ea typeface="ＭＳ Ｐゴシック" pitchFamily="-111" charset="-128"/>
-                <a:cs typeface="ＭＳ Ｐゴシック" pitchFamily="-111" charset="-128"/>
-              </a:defRPr>
-            </a:lvl1pPr>
-            <a:lvl2pPr marL="742950" indent="-285750" algn="l" defTabSz="457200" rtl="0" eaLnBrk="1" fontAlgn="base" hangingPunct="1">
-              <a:spcBef>
-                <a:spcPct val="20000"/>
-              </a:spcBef>
-              <a:spcAft>
-                <a:spcPct val="0"/>
-              </a:spcAft>
-              <a:buFont typeface="Arial" charset="0"/>
-              <a:buChar char="–"/>
-              <a:defRPr sz="2200" kern="1200">
-                <a:solidFill>
-                  <a:schemeClr val="tx1"/>
-                </a:solidFill>
-                <a:latin typeface="+mn-lt"/>
-                <a:ea typeface="ＭＳ Ｐゴシック" pitchFamily="-111" charset="-128"/>
-                <a:cs typeface="ＭＳ Ｐゴシック"/>
-              </a:defRPr>
-            </a:lvl2pPr>
-            <a:lvl3pPr marL="1143000" indent="-228600" algn="l" defTabSz="457200" rtl="0" eaLnBrk="1" fontAlgn="base" hangingPunct="1">
-              <a:spcBef>
-                <a:spcPct val="20000"/>
-              </a:spcBef>
-              <a:spcAft>
-                <a:spcPct val="0"/>
-              </a:spcAft>
-              <a:buFont typeface="Calibri" pitchFamily="34" charset="0"/>
-              <a:buChar char="»"/>
-              <a:defRPr sz="2000" kern="1200">
-                <a:solidFill>
-                  <a:schemeClr val="tx1"/>
-                </a:solidFill>
-                <a:latin typeface="+mn-lt"/>
-                <a:ea typeface="ＭＳ Ｐゴシック" pitchFamily="-111" charset="-128"/>
-                <a:cs typeface="ＭＳ Ｐゴシック"/>
-              </a:defRPr>
-            </a:lvl3pPr>
-            <a:lvl4pPr marL="1600200" indent="-228600" algn="l" defTabSz="457200" rtl="0" eaLnBrk="1" fontAlgn="base" hangingPunct="1">
-              <a:spcBef>
-                <a:spcPct val="20000"/>
-              </a:spcBef>
-              <a:spcAft>
-                <a:spcPct val="0"/>
-              </a:spcAft>
-              <a:buFont typeface="Arial" charset="0"/>
-              <a:buChar char="–"/>
-              <a:defRPr sz="1800" kern="1200">
-                <a:solidFill>
-                  <a:schemeClr val="tx1">
-                    <a:lumMod val="75000"/>
-                    <a:lumOff val="25000"/>
-                  </a:schemeClr>
-                </a:solidFill>
-                <a:latin typeface="+mn-lt"/>
-                <a:ea typeface="ＭＳ Ｐゴシック" pitchFamily="-111" charset="-128"/>
-                <a:cs typeface="ＭＳ Ｐゴシック"/>
-              </a:defRPr>
-            </a:lvl4pPr>
-            <a:lvl5pPr marL="2057400" indent="-228600" algn="l" defTabSz="457200" rtl="0" eaLnBrk="1" fontAlgn="base" hangingPunct="1">
-              <a:spcBef>
-                <a:spcPct val="20000"/>
-              </a:spcBef>
-              <a:spcAft>
-                <a:spcPct val="0"/>
-              </a:spcAft>
-              <a:buFont typeface="Arial" charset="0"/>
-              <a:buChar char="»"/>
-              <a:defRPr sz="1800" kern="1200">
-                <a:solidFill>
-                  <a:schemeClr val="tx1">
-                    <a:lumMod val="75000"/>
-                    <a:lumOff val="25000"/>
-                  </a:schemeClr>
-                </a:solidFill>
-                <a:latin typeface="+mn-lt"/>
-                <a:ea typeface="ＭＳ Ｐゴシック" pitchFamily="-111" charset="-128"/>
-                <a:cs typeface="ＭＳ Ｐゴシック"/>
-              </a:defRPr>
-            </a:lvl5pPr>
-            <a:lvl6pPr marL="2514600" indent="-228600" algn="l" defTabSz="457200" rtl="0" eaLnBrk="1" latinLnBrk="0" hangingPunct="1">
-              <a:spcBef>
-                <a:spcPct val="20000"/>
-              </a:spcBef>
-              <a:buFont typeface="Arial"/>
-              <a:buChar char="•"/>
-              <a:defRPr sz="2000" kern="1200">
-                <a:solidFill>
-                  <a:schemeClr val="tx1"/>
-                </a:solidFill>
-                <a:latin typeface="+mn-lt"/>
-                <a:ea typeface="+mn-ea"/>
-                <a:cs typeface="+mn-cs"/>
-              </a:defRPr>
-            </a:lvl6pPr>
-            <a:lvl7pPr marL="2971800" indent="-228600" algn="l" defTabSz="457200" rtl="0" eaLnBrk="1" latinLnBrk="0" hangingPunct="1">
-              <a:spcBef>
-                <a:spcPct val="20000"/>
-              </a:spcBef>
-              <a:buFont typeface="Arial"/>
-              <a:buChar char="•"/>
-              <a:defRPr sz="2000" kern="1200">
-                <a:solidFill>
-                  <a:schemeClr val="tx1"/>
-                </a:solidFill>
-                <a:latin typeface="+mn-lt"/>
-                <a:ea typeface="+mn-ea"/>
-                <a:cs typeface="+mn-cs"/>
-              </a:defRPr>
-            </a:lvl7pPr>
-            <a:lvl8pPr marL="3429000" indent="-228600" algn="l" defTabSz="457200" rtl="0" eaLnBrk="1" latinLnBrk="0" hangingPunct="1">
-              <a:spcBef>
-                <a:spcPct val="20000"/>
-              </a:spcBef>
-              <a:buFont typeface="Arial"/>
-              <a:buChar char="•"/>
-              <a:defRPr sz="2000" kern="1200">
-                <a:solidFill>
-                  <a:schemeClr val="tx1"/>
-                </a:solidFill>
-                <a:latin typeface="+mn-lt"/>
-                <a:ea typeface="+mn-ea"/>
-                <a:cs typeface="+mn-cs"/>
-              </a:defRPr>
-            </a:lvl8pPr>
-            <a:lvl9pPr marL="3886200" indent="-228600" algn="l" defTabSz="457200" rtl="0" eaLnBrk="1" latinLnBrk="0" hangingPunct="1">
-              <a:spcBef>
-                <a:spcPct val="20000"/>
-              </a:spcBef>
-              <a:buFont typeface="Arial"/>
-              <a:buChar char="•"/>
-              <a:defRPr sz="2000" kern="1200">
-                <a:solidFill>
-                  <a:schemeClr val="tx1"/>
-                </a:solidFill>
-                <a:latin typeface="+mn-lt"/>
-                <a:ea typeface="+mn-ea"/>
-                <a:cs typeface="+mn-cs"/>
-              </a:defRPr>
-            </a:lvl9pPr>
-          </a:lstStyle>
-          <a:p>
-            <a:pPr marL="0" lvl="1" indent="0">
               <a:buFont typeface="Arial" charset="0"/>
               <a:buNone/>
               <a:defRPr/>
             </a:pPr>
             <a:r>
-              <a:rPr lang="en-US" sz="1800" dirty="0">
+              <a:rPr lang="sv-SE">
+                <a:solidFill>
+                  <a:schemeClr val="tx1"/>
+                </a:solidFill>
+                <a:latin typeface="Calibri" pitchFamily="34" charset="0"/>
                 <a:hlinkClick r:id="rId2"/>
               </a:rPr>
-              <a:t>http://localhost:9966/</a:t>
-            </a:r>
-            <a:r>
-              <a:rPr lang="en-US" sz="1800" dirty="0" err="1">
-                <a:hlinkClick r:id="rId2"/>
-              </a:rPr>
-              <a:t>petclinic</a:t>
-            </a:r>
-            <a:r>
-              <a:rPr lang="en-US" sz="1800" dirty="0" smtClean="0">
-                <a:hlinkClick r:id="rId2"/>
-              </a:rPr>
-              <a:t>/</a:t>
-            </a:r>
-            <a:endParaRPr lang="en-US" sz="1800" dirty="0"/>
+              <a:t>http://localhost:9966/petclinic/</a:t>
+            </a:r>
+            <a:endParaRPr lang="sv-SE">
+              <a:solidFill>
+                <a:schemeClr val="tx1"/>
+              </a:solidFill>
+              <a:latin typeface="Calibri" pitchFamily="34" charset="0"/>
+            </a:endParaRPr>
           </a:p>
         </p:txBody>
       </p:sp>
@@ -5548,7 +5508,7 @@
       </p:grpSpPr>
       <p:sp>
         <p:nvSpPr>
-          <p:cNvPr id="14337" name="Title 1"/>
+          <p:cNvPr id="15361" name="Title 1"/>
           <p:cNvSpPr>
             <a:spLocks noGrp="1"/>
           </p:cNvSpPr>
@@ -5557,6 +5517,10 @@
           </p:nvPr>
         </p:nvSpPr>
         <p:spPr bwMode="auto">
+          <a:xfrm>
+            <a:off x="685800" y="571500"/>
+            <a:ext cx="7772400" cy="757238"/>
+          </a:xfrm>
           <a:noFill/>
           <a:ln>
             <a:miter lim="800000"/>
@@ -5572,6 +5536,7 @@
           </a:bodyPr>
           <a:lstStyle/>
           <a:p>
+            <a:pPr eaLnBrk="1" hangingPunct="1"/>
             <a:r>
               <a:rPr lang="en-US" smtClean="0">
                 <a:latin typeface="Cambria" pitchFamily="18" charset="0"/>
@@ -5593,12 +5558,17 @@
             <p:ph type="body" sz="quarter" idx="13"/>
           </p:nvPr>
         </p:nvSpPr>
-        <p:spPr/>
+        <p:spPr>
+          <a:xfrm>
+            <a:off x="685800" y="1557338"/>
+            <a:ext cx="7721600" cy="4679950"/>
+          </a:xfrm>
+        </p:spPr>
         <p:txBody>
           <a:bodyPr/>
           <a:lstStyle/>
           <a:p>
-            <a:pPr>
+            <a:pPr eaLnBrk="1" hangingPunct="1">
               <a:defRPr/>
             </a:pPr>
             <a:r>
@@ -5607,7 +5577,7 @@
             </a:r>
           </a:p>
           <a:p>
-            <a:pPr marL="857250" lvl="1" indent="-457200">
+            <a:pPr marL="857250" lvl="1" indent="-457200" eaLnBrk="1" hangingPunct="1">
               <a:defRPr/>
             </a:pPr>
             <a:r>
@@ -5616,7 +5586,7 @@
             </a:r>
           </a:p>
           <a:p>
-            <a:pPr marL="857250" lvl="1" indent="-457200">
+            <a:pPr marL="857250" lvl="1" indent="-457200" eaLnBrk="1" hangingPunct="1">
               <a:defRPr/>
             </a:pPr>
             <a:r>
@@ -5625,7 +5595,7 @@
             </a:r>
           </a:p>
           <a:p>
-            <a:pPr marL="857250" lvl="1" indent="-457200">
+            <a:pPr marL="857250" lvl="1" indent="-457200" eaLnBrk="1" hangingPunct="1">
               <a:defRPr/>
             </a:pPr>
             <a:r>
@@ -5634,7 +5604,7 @@
             </a:r>
           </a:p>
           <a:p>
-            <a:pPr>
+            <a:pPr eaLnBrk="1" hangingPunct="1">
               <a:defRPr/>
             </a:pPr>
             <a:r>
@@ -5643,7 +5613,7 @@
             </a:r>
           </a:p>
           <a:p>
-            <a:pPr lvl="1">
+            <a:pPr lvl="1" eaLnBrk="1" hangingPunct="1">
               <a:defRPr/>
             </a:pPr>
             <a:r>
@@ -5652,7 +5622,7 @@
             </a:r>
           </a:p>
           <a:p>
-            <a:pPr lvl="1">
+            <a:pPr lvl="1" eaLnBrk="1" hangingPunct="1">
               <a:defRPr/>
             </a:pPr>
             <a:r>
@@ -5665,7 +5635,7 @@
             </a:r>
           </a:p>
           <a:p>
-            <a:pPr lvl="1">
+            <a:pPr lvl="1" eaLnBrk="1" hangingPunct="1">
               <a:defRPr/>
             </a:pPr>
             <a:r>
@@ -5674,7 +5644,7 @@
             </a:r>
           </a:p>
           <a:p>
-            <a:pPr>
+            <a:pPr eaLnBrk="1" hangingPunct="1">
               <a:defRPr/>
             </a:pPr>
             <a:r>
@@ -5683,7 +5653,7 @@
             </a:r>
           </a:p>
           <a:p>
-            <a:pPr lvl="1">
+            <a:pPr lvl="1" eaLnBrk="1" hangingPunct="1">
               <a:defRPr/>
             </a:pPr>
             <a:r>
@@ -5692,7 +5662,7 @@
             </a:r>
           </a:p>
           <a:p>
-            <a:pPr lvl="1">
+            <a:pPr lvl="1" eaLnBrk="1" hangingPunct="1">
               <a:defRPr/>
             </a:pPr>
             <a:r>
@@ -5701,7 +5671,7 @@
             </a:r>
           </a:p>
           <a:p>
-            <a:pPr>
+            <a:pPr eaLnBrk="1" hangingPunct="1">
               <a:defRPr/>
             </a:pPr>
             <a:r>
@@ -5710,7 +5680,7 @@
             </a:r>
           </a:p>
           <a:p>
-            <a:pPr>
+            <a:pPr eaLnBrk="1" hangingPunct="1">
               <a:defRPr/>
             </a:pPr>
             <a:r>
@@ -5719,7 +5689,7 @@
             </a:r>
           </a:p>
           <a:p>
-            <a:pPr>
+            <a:pPr eaLnBrk="1" hangingPunct="1">
               <a:defRPr/>
             </a:pPr>
             <a:r>
@@ -5737,7 +5707,7 @@
   <p:timing>
     <p:tnLst>
       <p:par>
-        <p:cTn xmlns:p14="http://schemas.microsoft.com/office/powerpoint/2010/main" id="1" dur="indefinite" restart="never" nodeType="tmRoot"/>
+        <p:cTn id="1" dur="indefinite" restart="never" nodeType="tmRoot"/>
       </p:par>
     </p:tnLst>
   </p:timing>
@@ -5771,14 +5741,19 @@
             <p:ph type="ctrTitle"/>
           </p:nvPr>
         </p:nvSpPr>
-        <p:spPr/>
+        <p:spPr>
+          <a:xfrm>
+            <a:off x="685800" y="571500"/>
+            <a:ext cx="7772400" cy="757238"/>
+          </a:xfrm>
+        </p:spPr>
         <p:txBody>
           <a:bodyPr anchor="t">
             <a:normAutofit fontScale="90000"/>
           </a:bodyPr>
           <a:lstStyle/>
           <a:p>
-            <a:pPr>
+            <a:pPr eaLnBrk="1" hangingPunct="1">
               <a:defRPr/>
             </a:pPr>
             <a:r>
@@ -5798,7 +5773,7 @@
       </p:sp>
       <p:sp>
         <p:nvSpPr>
-          <p:cNvPr id="15362" name="Text Placeholder 2"/>
+          <p:cNvPr id="16386" name="Text Placeholder 2"/>
           <p:cNvSpPr>
             <a:spLocks noGrp="1"/>
           </p:cNvSpPr>
@@ -5807,6 +5782,10 @@
           </p:nvPr>
         </p:nvSpPr>
         <p:spPr bwMode="auto">
+          <a:xfrm>
+            <a:off x="685800" y="1557338"/>
+            <a:ext cx="7721600" cy="4679950"/>
+          </a:xfrm>
           <a:noFill/>
           <a:ln>
             <a:miter lim="800000"/>
@@ -5822,8 +5801,9 @@
           </a:bodyPr>
           <a:lstStyle/>
           <a:p>
-            <a:r>
-              <a:rPr lang="en-US" sz="2000" dirty="0" smtClean="0">
+            <a:pPr eaLnBrk="1" hangingPunct="1"/>
+            <a:r>
+              <a:rPr lang="en-US" sz="2000" smtClean="0">
                 <a:ea typeface="ＭＳ Ｐゴシック"/>
                 <a:cs typeface="ＭＳ Ｐゴシック"/>
               </a:rPr>
@@ -5831,8 +5811,9 @@
             </a:r>
           </a:p>
           <a:p>
-            <a:r>
-              <a:rPr lang="en-US" sz="2000" dirty="0" smtClean="0">
+            <a:pPr eaLnBrk="1" hangingPunct="1"/>
+            <a:r>
+              <a:rPr lang="en-US" sz="2000" smtClean="0">
                 <a:ea typeface="ＭＳ Ｐゴシック"/>
                 <a:cs typeface="ＭＳ Ｐゴシック"/>
               </a:rPr>
@@ -5840,8 +5821,9 @@
             </a:r>
           </a:p>
           <a:p>
-            <a:r>
-              <a:rPr lang="en-US" sz="2000" dirty="0" smtClean="0">
+            <a:pPr eaLnBrk="1" hangingPunct="1"/>
+            <a:r>
+              <a:rPr lang="en-US" sz="2000" smtClean="0">
                 <a:ea typeface="ＭＳ Ｐゴシック"/>
                 <a:cs typeface="ＭＳ Ｐゴシック"/>
               </a:rPr>
@@ -5849,8 +5831,9 @@
             </a:r>
           </a:p>
           <a:p>
-            <a:r>
-              <a:rPr lang="en-US" sz="2000" dirty="0" smtClean="0">
+            <a:pPr eaLnBrk="1" hangingPunct="1"/>
+            <a:r>
+              <a:rPr lang="en-US" sz="2000" smtClean="0">
                 <a:ea typeface="ＭＳ Ｐゴシック"/>
                 <a:cs typeface="ＭＳ Ｐゴシック"/>
               </a:rPr>
@@ -5858,20 +5841,22 @@
             </a:r>
           </a:p>
           <a:p>
-            <a:r>
-              <a:rPr lang="en-US" sz="2000" dirty="0" smtClean="0">
+            <a:pPr eaLnBrk="1" hangingPunct="1"/>
+            <a:r>
+              <a:rPr lang="en-US" sz="2000" smtClean="0">
                 <a:ea typeface="ＭＳ Ｐゴシック"/>
                 <a:cs typeface="ＭＳ Ｐゴシック"/>
               </a:rPr>
               <a:t>For this tutorial, you should use Java JDK in version 7 or higher.</a:t>
             </a:r>
-            <a:endParaRPr lang="en-US" dirty="0" smtClean="0">
+            <a:endParaRPr lang="en-US" smtClean="0">
               <a:ea typeface="ＭＳ Ｐゴシック"/>
               <a:cs typeface="ＭＳ Ｐゴシック"/>
             </a:endParaRPr>
           </a:p>
           <a:p>
-            <a:endParaRPr lang="en-US" dirty="0" smtClean="0">
+            <a:pPr eaLnBrk="1" hangingPunct="1"/>
+            <a:endParaRPr lang="en-US" smtClean="0">
               <a:ea typeface="ＭＳ Ｐゴシック"/>
               <a:cs typeface="ＭＳ Ｐゴシック"/>
             </a:endParaRPr>
@@ -5886,7 +5871,7 @@
   <p:timing>
     <p:tnLst>
       <p:par>
-        <p:cTn xmlns:p14="http://schemas.microsoft.com/office/powerpoint/2010/main" id="1" dur="indefinite" restart="never" nodeType="tmRoot"/>
+        <p:cTn id="1" dur="indefinite" restart="never" nodeType="tmRoot"/>
       </p:par>
     </p:tnLst>
   </p:timing>
@@ -5920,14 +5905,19 @@
             <p:ph type="ctrTitle"/>
           </p:nvPr>
         </p:nvSpPr>
-        <p:spPr/>
+        <p:spPr>
+          <a:xfrm>
+            <a:off x="685800" y="571500"/>
+            <a:ext cx="7772400" cy="757238"/>
+          </a:xfrm>
+        </p:spPr>
         <p:txBody>
           <a:bodyPr anchor="t">
             <a:normAutofit fontScale="90000"/>
           </a:bodyPr>
           <a:lstStyle/>
           <a:p>
-            <a:pPr>
+            <a:pPr eaLnBrk="1" hangingPunct="1">
               <a:defRPr/>
             </a:pPr>
             <a:r>
@@ -5947,7 +5937,7 @@
       </p:sp>
       <p:sp>
         <p:nvSpPr>
-          <p:cNvPr id="16386" name="Text Placeholder 2"/>
+          <p:cNvPr id="17410" name="Text Placeholder 2"/>
           <p:cNvSpPr>
             <a:spLocks noGrp="1"/>
           </p:cNvSpPr>
@@ -5956,6 +5946,10 @@
           </p:nvPr>
         </p:nvSpPr>
         <p:spPr bwMode="auto">
+          <a:xfrm>
+            <a:off x="685800" y="1557338"/>
+            <a:ext cx="7721600" cy="4679950"/>
+          </a:xfrm>
           <a:noFill/>
           <a:ln>
             <a:miter lim="800000"/>
@@ -5971,7 +5965,7 @@
           </a:bodyPr>
           <a:lstStyle/>
           <a:p>
-            <a:pPr marL="0" indent="0">
+            <a:pPr marL="0" indent="0" eaLnBrk="1" hangingPunct="1">
               <a:buFont typeface="Arial" charset="0"/>
               <a:buNone/>
             </a:pPr>
@@ -5984,7 +5978,7 @@
             </a:r>
           </a:p>
           <a:p>
-            <a:pPr marL="0" indent="0">
+            <a:pPr marL="0" indent="0" eaLnBrk="1" hangingPunct="1">
               <a:buFont typeface="Arial" charset="0"/>
               <a:buNone/>
             </a:pPr>
@@ -5997,7 +5991,7 @@
             </a:r>
           </a:p>
           <a:p>
-            <a:pPr marL="0" indent="0">
+            <a:pPr marL="0" indent="0" eaLnBrk="1" hangingPunct="1">
               <a:buFont typeface="Arial" charset="0"/>
               <a:buNone/>
             </a:pPr>
@@ -6038,7 +6032,7 @@
             </a:r>
           </a:p>
           <a:p>
-            <a:pPr marL="457200" lvl="1" indent="0">
+            <a:pPr marL="457200" lvl="1" indent="0" eaLnBrk="1" hangingPunct="1">
               <a:buFont typeface="Arial" charset="0"/>
               <a:buNone/>
             </a:pPr>
@@ -6252,22 +6246,8 @@
               <a:defRPr/>
             </a:pPr>
             <a:r>
-              <a:rPr lang="en-US" sz="1800" dirty="0" smtClean="0">
-                <a:hlinkClick r:id="rId2"/>
-              </a:rPr>
-              <a:t>http://</a:t>
-            </a:r>
-            <a:r>
-              <a:rPr lang="en-US" sz="1800" dirty="0" err="1" smtClean="0">
-                <a:hlinkClick r:id="rId2"/>
-              </a:rPr>
-              <a:t>www.eclipse.org</a:t>
-            </a:r>
-            <a:r>
-              <a:rPr lang="en-US" sz="1800" dirty="0" smtClean="0">
-                <a:hlinkClick r:id="rId2"/>
-              </a:rPr>
-              <a:t>/downloads</a:t>
+              <a:rPr lang="en-US" sz="1800" dirty="0" smtClean="0"/>
+              <a:t>www.eclipse.org/downloads</a:t>
             </a:r>
             <a:endParaRPr lang="en-US" sz="1800" dirty="0"/>
           </a:p>
@@ -6281,7 +6261,7 @@
   <p:timing>
     <p:tnLst>
       <p:par>
-        <p:cTn xmlns:p14="http://schemas.microsoft.com/office/powerpoint/2010/main" id="1" dur="indefinite" restart="never" nodeType="tmRoot"/>
+        <p:cTn id="1" dur="indefinite" restart="never" nodeType="tmRoot"/>
       </p:par>
     </p:tnLst>
   </p:timing>
@@ -6315,14 +6295,19 @@
             <p:ph type="ctrTitle"/>
           </p:nvPr>
         </p:nvSpPr>
-        <p:spPr/>
+        <p:spPr>
+          <a:xfrm>
+            <a:off x="685800" y="571500"/>
+            <a:ext cx="7772400" cy="757238"/>
+          </a:xfrm>
+        </p:spPr>
         <p:txBody>
           <a:bodyPr anchor="t">
             <a:normAutofit fontScale="90000"/>
           </a:bodyPr>
           <a:lstStyle/>
           <a:p>
-            <a:pPr>
+            <a:pPr eaLnBrk="1" hangingPunct="1">
               <a:defRPr/>
             </a:pPr>
             <a:r>
@@ -6342,7 +6327,7 @@
       </p:sp>
       <p:sp>
         <p:nvSpPr>
-          <p:cNvPr id="17410" name="Text Placeholder 2"/>
+          <p:cNvPr id="18434" name="Text Placeholder 2"/>
           <p:cNvSpPr>
             <a:spLocks noGrp="1"/>
           </p:cNvSpPr>
@@ -6351,6 +6336,10 @@
           </p:nvPr>
         </p:nvSpPr>
         <p:spPr bwMode="auto">
+          <a:xfrm>
+            <a:off x="685800" y="1557338"/>
+            <a:ext cx="7721600" cy="4679950"/>
+          </a:xfrm>
           <a:noFill/>
           <a:ln>
             <a:miter lim="800000"/>
@@ -6366,7 +6355,7 @@
           </a:bodyPr>
           <a:lstStyle/>
           <a:p>
-            <a:pPr marL="57150" indent="0">
+            <a:pPr marL="57150" indent="0" eaLnBrk="1" hangingPunct="1">
               <a:buFont typeface="Arial" charset="0"/>
               <a:buNone/>
             </a:pPr>
@@ -6397,32 +6386,34 @@
       </p:sp>
       <p:pic>
         <p:nvPicPr>
-          <p:cNvPr id="4" name="Picture 3" descr="Screen Shot 2015-01-11 at 01.37.26.png"/>
+          <p:cNvPr id="18435" name="Picture 3" descr="Screen Shot 2015-01-11 at 01.37.26.png"/>
           <p:cNvPicPr>
             <a:picLocks noChangeAspect="1"/>
           </p:cNvPicPr>
           <p:nvPr/>
         </p:nvPicPr>
         <p:blipFill>
-          <a:blip r:embed="rId2">
-            <a:extLst>
-              <a:ext uri="{28A0092B-C50C-407E-A947-70E740481C1C}">
-                <a14:useLocalDpi xmlns:a14="http://schemas.microsoft.com/office/drawing/2010/main" val="0"/>
-              </a:ext>
-            </a:extLst>
-          </a:blip>
+          <a:blip r:embed="rId2"/>
+          <a:srcRect/>
           <a:stretch>
             <a:fillRect/>
           </a:stretch>
         </p:blipFill>
-        <p:spPr>
+        <p:spPr bwMode="auto">
           <a:xfrm>
-            <a:off x="755576" y="2852937"/>
-            <a:ext cx="6408712" cy="2925078"/>
+            <a:off x="755650" y="2852738"/>
+            <a:ext cx="6408738" cy="2925762"/>
           </a:xfrm>
           <a:prstGeom prst="rect">
             <a:avLst/>
           </a:prstGeom>
+          <a:noFill/>
+          <a:ln w="9525">
+            <a:noFill/>
+            <a:miter lim="800000"/>
+            <a:headEnd/>
+            <a:tailEnd/>
+          </a:ln>
         </p:spPr>
       </p:pic>
     </p:spTree>
@@ -6433,7 +6424,7 @@
   <p:timing>
     <p:tnLst>
       <p:par>
-        <p:cTn xmlns:p14="http://schemas.microsoft.com/office/powerpoint/2010/main" id="1" dur="indefinite" restart="never" nodeType="tmRoot"/>
+        <p:cTn id="1" dur="indefinite" restart="never" nodeType="tmRoot"/>
       </p:par>
     </p:tnLst>
   </p:timing>
@@ -6467,14 +6458,19 @@
             <p:ph type="ctrTitle"/>
           </p:nvPr>
         </p:nvSpPr>
-        <p:spPr/>
+        <p:spPr>
+          <a:xfrm>
+            <a:off x="685800" y="571500"/>
+            <a:ext cx="7772400" cy="757238"/>
+          </a:xfrm>
+        </p:spPr>
         <p:txBody>
           <a:bodyPr anchor="t">
             <a:normAutofit fontScale="90000"/>
           </a:bodyPr>
           <a:lstStyle/>
           <a:p>
-            <a:pPr>
+            <a:pPr eaLnBrk="1" hangingPunct="1">
               <a:defRPr/>
             </a:pPr>
             <a:r>
@@ -6494,7 +6490,7 @@
       </p:sp>
       <p:sp>
         <p:nvSpPr>
-          <p:cNvPr id="18434" name="Text Placeholder 2"/>
+          <p:cNvPr id="19458" name="Text Placeholder 2"/>
           <p:cNvSpPr>
             <a:spLocks noGrp="1"/>
           </p:cNvSpPr>
@@ -6503,6 +6499,10 @@
           </p:nvPr>
         </p:nvSpPr>
         <p:spPr bwMode="auto">
+          <a:xfrm>
+            <a:off x="685800" y="1557338"/>
+            <a:ext cx="7721600" cy="4679950"/>
+          </a:xfrm>
           <a:noFill/>
           <a:ln>
             <a:miter lim="800000"/>
@@ -6518,7 +6518,7 @@
           </a:bodyPr>
           <a:lstStyle/>
           <a:p>
-            <a:pPr marL="0" indent="0">
+            <a:pPr marL="0" indent="0" eaLnBrk="1" hangingPunct="1">
               <a:buFont typeface="Arial" charset="0"/>
               <a:buNone/>
             </a:pPr>
@@ -6546,7 +6546,7 @@
             </a:r>
           </a:p>
           <a:p>
-            <a:pPr marL="0" indent="0">
+            <a:pPr marL="0" indent="0" eaLnBrk="1" hangingPunct="1">
               <a:buFont typeface="Arial" charset="0"/>
               <a:buNone/>
             </a:pPr>
@@ -6556,7 +6556,7 @@
             </a:endParaRPr>
           </a:p>
           <a:p>
-            <a:pPr marL="0" indent="0">
+            <a:pPr marL="0" indent="0" eaLnBrk="1" hangingPunct="1">
               <a:buFont typeface="Arial" charset="0"/>
               <a:buNone/>
             </a:pPr>
@@ -6569,7 +6569,7 @@
             </a:r>
           </a:p>
           <a:p>
-            <a:pPr marL="0" indent="0">
+            <a:pPr marL="0" indent="0" eaLnBrk="1" hangingPunct="1">
               <a:buFont typeface="Arial" charset="0"/>
               <a:buNone/>
             </a:pPr>
@@ -6579,7 +6579,7 @@
             </a:endParaRPr>
           </a:p>
           <a:p>
-            <a:pPr marL="0" indent="0">
+            <a:pPr marL="0" indent="0" eaLnBrk="1" hangingPunct="1">
               <a:buFont typeface="Arial" charset="0"/>
               <a:buNone/>
             </a:pPr>
@@ -6592,7 +6592,7 @@
             </a:r>
           </a:p>
           <a:p>
-            <a:pPr marL="0" indent="0">
+            <a:pPr marL="0" indent="0" eaLnBrk="1" hangingPunct="1">
               <a:buFont typeface="Arial" charset="0"/>
               <a:buNone/>
             </a:pPr>
@@ -6602,7 +6602,7 @@
             </a:endParaRPr>
           </a:p>
           <a:p>
-            <a:pPr marL="0" indent="0">
+            <a:pPr marL="0" indent="0" eaLnBrk="1" hangingPunct="1">
               <a:buFont typeface="Arial" charset="0"/>
               <a:buNone/>
             </a:pPr>
@@ -6654,7 +6654,7 @@
   <p:timing>
     <p:tnLst>
       <p:par>
-        <p:cTn xmlns:p14="http://schemas.microsoft.com/office/powerpoint/2010/main" id="1" dur="indefinite" restart="never" nodeType="tmRoot"/>
+        <p:cTn id="1" dur="indefinite" restart="never" nodeType="tmRoot"/>
       </p:par>
     </p:tnLst>
   </p:timing>
@@ -6688,14 +6688,19 @@
             <p:ph type="ctrTitle"/>
           </p:nvPr>
         </p:nvSpPr>
-        <p:spPr/>
+        <p:spPr>
+          <a:xfrm>
+            <a:off x="685800" y="571500"/>
+            <a:ext cx="7772400" cy="757238"/>
+          </a:xfrm>
+        </p:spPr>
         <p:txBody>
           <a:bodyPr anchor="t">
             <a:normAutofit fontScale="90000"/>
           </a:bodyPr>
           <a:lstStyle/>
           <a:p>
-            <a:pPr>
+            <a:pPr eaLnBrk="1" hangingPunct="1">
               <a:defRPr/>
             </a:pPr>
             <a:r>
@@ -6715,7 +6720,7 @@
       </p:sp>
       <p:sp>
         <p:nvSpPr>
-          <p:cNvPr id="19458" name="Text Placeholder 2"/>
+          <p:cNvPr id="20482" name="Text Placeholder 2"/>
           <p:cNvSpPr>
             <a:spLocks noGrp="1"/>
           </p:cNvSpPr>
@@ -6724,6 +6729,10 @@
           </p:nvPr>
         </p:nvSpPr>
         <p:spPr bwMode="auto">
+          <a:xfrm>
+            <a:off x="685800" y="1557338"/>
+            <a:ext cx="7721600" cy="4679950"/>
+          </a:xfrm>
           <a:noFill/>
           <a:ln>
             <a:miter lim="800000"/>
@@ -6739,7 +6748,7 @@
           </a:bodyPr>
           <a:lstStyle/>
           <a:p>
-            <a:pPr marL="0" indent="0">
+            <a:pPr marL="0" indent="0" eaLnBrk="1" hangingPunct="1">
               <a:buFont typeface="Arial" charset="0"/>
               <a:buNone/>
             </a:pPr>
@@ -6755,7 +6764,7 @@
       </p:sp>
       <p:pic>
         <p:nvPicPr>
-          <p:cNvPr id="19459" name="Picture 3"/>
+          <p:cNvPr id="20483" name="Picture 3"/>
           <p:cNvPicPr>
             <a:picLocks noChangeAspect="1"/>
           </p:cNvPicPr>
@@ -6793,7 +6802,7 @@
   <p:timing>
     <p:tnLst>
       <p:par>
-        <p:cTn xmlns:p14="http://schemas.microsoft.com/office/powerpoint/2010/main" id="1" dur="indefinite" restart="never" nodeType="tmRoot"/>
+        <p:cTn id="1" dur="indefinite" restart="never" nodeType="tmRoot"/>
       </p:par>
     </p:tnLst>
   </p:timing>
@@ -6827,14 +6836,19 @@
             <p:ph type="ctrTitle"/>
           </p:nvPr>
         </p:nvSpPr>
-        <p:spPr/>
+        <p:spPr>
+          <a:xfrm>
+            <a:off x="685800" y="571500"/>
+            <a:ext cx="7772400" cy="757238"/>
+          </a:xfrm>
+        </p:spPr>
         <p:txBody>
           <a:bodyPr anchor="t">
             <a:normAutofit fontScale="90000"/>
           </a:bodyPr>
           <a:lstStyle/>
           <a:p>
-            <a:pPr>
+            <a:pPr eaLnBrk="1" hangingPunct="1">
               <a:defRPr/>
             </a:pPr>
             <a:r>
@@ -6862,7 +6876,7 @@
       </p:sp>
       <p:sp>
         <p:nvSpPr>
-          <p:cNvPr id="20482" name="Text Placeholder 2"/>
+          <p:cNvPr id="21506" name="Text Placeholder 2"/>
           <p:cNvSpPr>
             <a:spLocks noGrp="1"/>
           </p:cNvSpPr>
@@ -6871,6 +6885,10 @@
           </p:nvPr>
         </p:nvSpPr>
         <p:spPr bwMode="auto">
+          <a:xfrm>
+            <a:off x="685800" y="1557338"/>
+            <a:ext cx="7721600" cy="4679950"/>
+          </a:xfrm>
           <a:noFill/>
           <a:ln>
             <a:miter lim="800000"/>
@@ -6886,9 +6904,9 @@
           </a:bodyPr>
           <a:lstStyle/>
           <a:p>
-            <a:pPr marL="400050"/>
-            <a:r>
-              <a:rPr lang="en-US" sz="2000" dirty="0" smtClean="0">
+            <a:pPr marL="400050" eaLnBrk="1" hangingPunct="1"/>
+            <a:r>
+              <a:rPr lang="en-US" sz="2000" smtClean="0">
                 <a:ea typeface="ＭＳ Ｐゴシック"/>
                 <a:cs typeface="ＭＳ Ｐゴシック"/>
               </a:rPr>
@@ -6896,63 +6914,36 @@
             </a:r>
           </a:p>
           <a:p>
-            <a:pPr marL="800100" lvl="1"/>
-            <a:r>
-              <a:rPr lang="en-US" sz="1800" dirty="0">
+            <a:pPr marL="800100" lvl="1" eaLnBrk="1" hangingPunct="1"/>
+            <a:r>
+              <a:rPr lang="en-US" sz="1800" smtClean="0">
                 <a:ea typeface="ＭＳ Ｐゴシック"/>
-                <a:hlinkClick r:id="rId2"/>
               </a:rPr>
-              <a:t>http://dist.springsource.org/release/GRECLIPSE/</a:t>
-            </a:r>
-            <a:r>
-              <a:rPr lang="en-US" sz="1800" dirty="0" smtClean="0">
+              <a:t>dist.springsource.org/release/GRECLIPSE/e4.4/</a:t>
+            </a:r>
+          </a:p>
+          <a:p>
+            <a:pPr marL="800100" lvl="1" eaLnBrk="1" hangingPunct="1"/>
+            <a:r>
+              <a:rPr lang="en-US" sz="1800" smtClean="0">
                 <a:ea typeface="ＭＳ Ｐゴシック"/>
-                <a:hlinkClick r:id="rId2"/>
               </a:rPr>
-              <a:t>e4.4/</a:t>
-            </a:r>
-            <a:endParaRPr lang="en-US" sz="1800" dirty="0" smtClean="0">
-              <a:ea typeface="ＭＳ Ｐゴシック"/>
-            </a:endParaRPr>
-          </a:p>
-          <a:p>
-            <a:pPr marL="800100" lvl="1"/>
-            <a:r>
-              <a:rPr lang="en-US" sz="1800" dirty="0">
+              <a:t>dist.springsource.org/release/GRECLIPSE/e4.3/</a:t>
+            </a:r>
+          </a:p>
+          <a:p>
+            <a:pPr marL="800100" lvl="1" eaLnBrk="1" hangingPunct="1"/>
+            <a:r>
+              <a:rPr lang="en-US" sz="1800" smtClean="0">
                 <a:ea typeface="ＭＳ Ｐゴシック"/>
-                <a:hlinkClick r:id="rId2"/>
               </a:rPr>
-              <a:t>http://dist.springsource.org/release/GRECLIPSE/e4.3/</a:t>
-            </a:r>
-            <a:endParaRPr lang="en-US" sz="1800" dirty="0">
-              <a:ea typeface="ＭＳ Ｐゴシック"/>
-            </a:endParaRPr>
-          </a:p>
-          <a:p>
-            <a:pPr marL="800100" lvl="1"/>
-            <a:r>
-              <a:rPr lang="en-US" sz="1800" dirty="0">
-                <a:ea typeface="ＭＳ Ｐゴシック"/>
-                <a:hlinkClick r:id="rId2"/>
-              </a:rPr>
-              <a:t>http://dist.springsource.org/release/GRECLIPSE/</a:t>
-            </a:r>
-            <a:r>
-              <a:rPr lang="en-US" sz="1800" dirty="0" smtClean="0">
-                <a:ea typeface="ＭＳ Ｐゴシック"/>
-                <a:hlinkClick r:id="rId2"/>
-              </a:rPr>
-              <a:t>e4.2/</a:t>
-            </a:r>
-            <a:endParaRPr lang="en-US" sz="1800" dirty="0" smtClean="0">
-              <a:ea typeface="ＭＳ Ｐゴシック"/>
-              <a:cs typeface="ＭＳ Ｐゴシック"/>
-            </a:endParaRPr>
-          </a:p>
-          <a:p>
-            <a:pPr marL="400050"/>
-            <a:r>
-              <a:rPr lang="en-US" sz="2000" dirty="0" smtClean="0">
+              <a:t>dist.springsource.org/release/GRECLIPSE/e4.2/</a:t>
+            </a:r>
+          </a:p>
+          <a:p>
+            <a:pPr marL="400050" eaLnBrk="1" hangingPunct="1"/>
+            <a:r>
+              <a:rPr lang="en-US" sz="2000" smtClean="0">
                 <a:ea typeface="ＭＳ Ｐゴシック"/>
                 <a:cs typeface="ＭＳ Ｐゴシック"/>
               </a:rPr>
@@ -6960,9 +6951,9 @@
             </a:r>
           </a:p>
           <a:p>
-            <a:pPr marL="400050"/>
-            <a:r>
-              <a:rPr lang="en-US" sz="2000" dirty="0" smtClean="0">
+            <a:pPr marL="400050" eaLnBrk="1" hangingPunct="1"/>
+            <a:r>
+              <a:rPr lang="en-US" sz="2000" smtClean="0">
                 <a:ea typeface="ＭＳ Ｐゴシック"/>
                 <a:cs typeface="ＭＳ Ｐゴシック"/>
               </a:rPr>
@@ -6970,9 +6961,9 @@
             </a:r>
           </a:p>
           <a:p>
-            <a:pPr marL="400050"/>
-            <a:r>
-              <a:rPr lang="en-US" sz="2000" dirty="0" smtClean="0">
+            <a:pPr marL="400050" eaLnBrk="1" hangingPunct="1"/>
+            <a:r>
+              <a:rPr lang="en-US" sz="2000" smtClean="0">
                 <a:ea typeface="ＭＳ Ｐゴシック"/>
                 <a:cs typeface="ＭＳ Ｐゴシック"/>
               </a:rPr>
@@ -6980,11 +6971,11 @@
             </a:r>
           </a:p>
           <a:p>
-            <a:pPr marL="400050">
+            <a:pPr marL="400050" eaLnBrk="1" hangingPunct="1">
               <a:buFont typeface="Lucida Grande"/>
               <a:buChar char="-"/>
             </a:pPr>
-            <a:endParaRPr lang="en-US" sz="2000" dirty="0" smtClean="0">
+            <a:endParaRPr lang="en-US" sz="2000" smtClean="0">
               <a:ea typeface="ＭＳ Ｐゴシック"/>
               <a:cs typeface="ＭＳ Ｐゴシック"/>
             </a:endParaRPr>
@@ -6993,32 +6984,34 @@
       </p:sp>
       <p:pic>
         <p:nvPicPr>
-          <p:cNvPr id="3" name="Picture 2" descr="Screen Shot 2015-01-11 at 01.42.51.png"/>
+          <p:cNvPr id="21507" name="Picture 2" descr="Screen Shot 2015-01-11 at 01.42.51.png"/>
           <p:cNvPicPr>
             <a:picLocks noChangeAspect="1"/>
           </p:cNvPicPr>
           <p:nvPr/>
         </p:nvPicPr>
         <p:blipFill>
-          <a:blip r:embed="rId3">
-            <a:extLst>
-              <a:ext uri="{28A0092B-C50C-407E-A947-70E740481C1C}">
-                <a14:useLocalDpi xmlns:a14="http://schemas.microsoft.com/office/drawing/2010/main" val="0"/>
-              </a:ext>
-            </a:extLst>
-          </a:blip>
+          <a:blip r:embed="rId2"/>
+          <a:srcRect/>
           <a:stretch>
             <a:fillRect/>
           </a:stretch>
         </p:blipFill>
-        <p:spPr>
+        <p:spPr bwMode="auto">
           <a:xfrm>
-            <a:off x="1403648" y="4797152"/>
-            <a:ext cx="6379375" cy="936104"/>
+            <a:off x="1403350" y="4797425"/>
+            <a:ext cx="6380163" cy="935038"/>
           </a:xfrm>
           <a:prstGeom prst="rect">
             <a:avLst/>
           </a:prstGeom>
+          <a:noFill/>
+          <a:ln w="9525">
+            <a:noFill/>
+            <a:miter lim="800000"/>
+            <a:headEnd/>
+            <a:tailEnd/>
+          </a:ln>
         </p:spPr>
       </p:pic>
     </p:spTree>
@@ -7029,7 +7022,7 @@
   <p:timing>
     <p:tnLst>
       <p:par>
-        <p:cTn xmlns:p14="http://schemas.microsoft.com/office/powerpoint/2010/main" id="1" dur="indefinite" restart="never" nodeType="tmRoot"/>
+        <p:cTn id="1" dur="indefinite" restart="never" nodeType="tmRoot"/>
       </p:par>
     </p:tnLst>
   </p:timing>
@@ -7063,14 +7056,19 @@
             <p:ph type="ctrTitle"/>
           </p:nvPr>
         </p:nvSpPr>
-        <p:spPr/>
+        <p:spPr>
+          <a:xfrm>
+            <a:off x="685800" y="571500"/>
+            <a:ext cx="7772400" cy="757238"/>
+          </a:xfrm>
+        </p:spPr>
         <p:txBody>
           <a:bodyPr anchor="t">
             <a:normAutofit fontScale="90000"/>
           </a:bodyPr>
           <a:lstStyle/>
           <a:p>
-            <a:pPr>
+            <a:pPr eaLnBrk="1" hangingPunct="1">
               <a:defRPr/>
             </a:pPr>
             <a:r>
@@ -7106,7 +7104,7 @@
       </p:sp>
       <p:sp>
         <p:nvSpPr>
-          <p:cNvPr id="21506" name="Text Placeholder 2"/>
+          <p:cNvPr id="22530" name="Text Placeholder 2"/>
           <p:cNvSpPr>
             <a:spLocks noGrp="1"/>
           </p:cNvSpPr>
@@ -7116,8 +7114,8 @@
         </p:nvSpPr>
         <p:spPr bwMode="auto">
           <a:xfrm>
-            <a:off x="685803" y="2060847"/>
-            <a:ext cx="8278685" cy="4176465"/>
+            <a:off x="685800" y="2060575"/>
+            <a:ext cx="8278813" cy="4176713"/>
           </a:xfrm>
           <a:noFill/>
           <a:ln>
@@ -7134,9 +7132,9 @@
           </a:bodyPr>
           <a:lstStyle/>
           <a:p>
-            <a:pPr marL="400050"/>
-            <a:r>
-              <a:rPr lang="en-US" dirty="0" smtClean="0">
+            <a:pPr marL="400050" eaLnBrk="1" hangingPunct="1"/>
+            <a:r>
+              <a:rPr lang="en-US" smtClean="0">
                 <a:ea typeface="ＭＳ Ｐゴシック"/>
                 <a:cs typeface="ＭＳ Ｐゴシック"/>
               </a:rPr>
@@ -7144,9 +7142,9 @@
             </a:r>
           </a:p>
           <a:p>
-            <a:pPr marL="400050"/>
-            <a:r>
-              <a:rPr lang="en-US" dirty="0" smtClean="0">
+            <a:pPr marL="400050" eaLnBrk="1" hangingPunct="1"/>
+            <a:r>
+              <a:rPr lang="en-US" smtClean="0">
                 <a:ea typeface="ＭＳ Ｐゴシック"/>
                 <a:cs typeface="ＭＳ Ｐゴシック"/>
               </a:rPr>
@@ -7154,53 +7152,40 @@
             </a:r>
           </a:p>
           <a:p>
-            <a:pPr marL="400050"/>
-            <a:endParaRPr lang="en-US" dirty="0" smtClean="0">
+            <a:pPr marL="400050" eaLnBrk="1" hangingPunct="1"/>
+            <a:endParaRPr lang="en-US" smtClean="0">
               <a:ea typeface="ＭＳ Ｐゴシック"/>
               <a:cs typeface="ＭＳ Ｐゴシック"/>
             </a:endParaRPr>
           </a:p>
           <a:p>
-            <a:pPr marL="400050">
+            <a:pPr marL="400050" eaLnBrk="1" hangingPunct="1">
+              <a:buFont typeface="Arial" charset="0"/>
               <a:buNone/>
             </a:pPr>
             <a:r>
-              <a:rPr lang="en-US" sz="1400" dirty="0">
+              <a:rPr lang="en-US" sz="1400" smtClean="0">
                 <a:ea typeface="ＭＳ Ｐゴシック"/>
                 <a:cs typeface="ＭＳ Ｐゴシック"/>
                 <a:sym typeface="Arial" charset="0"/>
-                <a:hlinkClick r:id="rId2"/>
               </a:rPr>
-              <a:t>http://repo1.maven.org/maven2/.m2e/connectors/m2eclipse-buildhelper/0.15.0/N/0.15.0.201405280027</a:t>
-            </a:r>
-            <a:r>
-              <a:rPr lang="en-US" sz="1400" dirty="0" smtClean="0">
-                <a:ea typeface="ＭＳ Ｐゴシック"/>
-                <a:cs typeface="ＭＳ Ｐゴシック"/>
-                <a:sym typeface="Arial" charset="0"/>
-                <a:hlinkClick r:id="rId2"/>
-              </a:rPr>
-              <a:t>/</a:t>
-            </a:r>
-            <a:endParaRPr lang="en-US" sz="1400" dirty="0" smtClean="0">
-              <a:ea typeface="ＭＳ Ｐゴシック"/>
-              <a:cs typeface="ＭＳ Ｐゴシック"/>
-              <a:sym typeface="Arial" charset="0"/>
-            </a:endParaRPr>
-          </a:p>
-          <a:p>
-            <a:pPr marL="400050">
+              <a:t>repo1.maven.org/maven2/.m2e/connectors/m2eclipse-buildhelper/0.15.0/N/0.15.0.201405280027/</a:t>
+            </a:r>
+          </a:p>
+          <a:p>
+            <a:pPr marL="400050" eaLnBrk="1" hangingPunct="1">
+              <a:buFont typeface="Arial" charset="0"/>
               <a:buNone/>
             </a:pPr>
-            <a:endParaRPr lang="en-US" dirty="0" smtClean="0">
+            <a:endParaRPr lang="en-US" smtClean="0">
               <a:ea typeface="ＭＳ Ｐゴシック"/>
               <a:cs typeface="ＭＳ Ｐゴシック"/>
             </a:endParaRPr>
           </a:p>
           <a:p>
-            <a:pPr marL="400050"/>
-            <a:r>
-              <a:rPr lang="en-US" dirty="0" smtClean="0">
+            <a:pPr marL="400050" eaLnBrk="1" hangingPunct="1"/>
+            <a:r>
+              <a:rPr lang="en-US" smtClean="0">
                 <a:ea typeface="ＭＳ Ｐゴシック"/>
                 <a:cs typeface="ＭＳ Ｐゴシック"/>
               </a:rPr>
@@ -7211,32 +7196,34 @@
       </p:sp>
       <p:pic>
         <p:nvPicPr>
-          <p:cNvPr id="3" name="Picture 2" descr="Screen Shot 2015-01-11 at 01.51.25.png"/>
+          <p:cNvPr id="22531" name="Picture 2" descr="Screen Shot 2015-01-11 at 01.51.25.png"/>
           <p:cNvPicPr>
             <a:picLocks noChangeAspect="1"/>
           </p:cNvPicPr>
           <p:nvPr/>
         </p:nvPicPr>
         <p:blipFill>
-          <a:blip r:embed="rId3">
-            <a:extLst>
-              <a:ext uri="{28A0092B-C50C-407E-A947-70E740481C1C}">
-                <a14:useLocalDpi xmlns:a14="http://schemas.microsoft.com/office/drawing/2010/main" val="0"/>
-              </a:ext>
-            </a:extLst>
-          </a:blip>
+          <a:blip r:embed="rId2"/>
+          <a:srcRect/>
           <a:stretch>
             <a:fillRect/>
           </a:stretch>
         </p:blipFill>
-        <p:spPr>
+        <p:spPr bwMode="auto">
           <a:xfrm>
-            <a:off x="1403648" y="5085184"/>
-            <a:ext cx="6005031" cy="1152128"/>
+            <a:off x="1403350" y="5084763"/>
+            <a:ext cx="6005513" cy="1152525"/>
           </a:xfrm>
           <a:prstGeom prst="rect">
             <a:avLst/>
           </a:prstGeom>
+          <a:noFill/>
+          <a:ln w="9525">
+            <a:noFill/>
+            <a:miter lim="800000"/>
+            <a:headEnd/>
+            <a:tailEnd/>
+          </a:ln>
         </p:spPr>
       </p:pic>
     </p:spTree>
@@ -7848,4 +7835,287 @@
   <a:objectDefaults/>
   <a:extraClrSchemeLst/>
 </a:theme>
+</file>
+
+<file path=ppt/theme/theme3.xml><?xml version="1.0" encoding="utf-8"?>
+<a:theme xmlns:a="http://schemas.openxmlformats.org/drawingml/2006/main" name="Office Theme">
+  <a:themeElements>
+    <a:clrScheme name="">
+      <a:dk1>
+        <a:srgbClr val="000000"/>
+      </a:dk1>
+      <a:lt1>
+        <a:srgbClr val="FFFFFF"/>
+      </a:lt1>
+      <a:dk2>
+        <a:srgbClr val="000000"/>
+      </a:dk2>
+      <a:lt2>
+        <a:srgbClr val="808080"/>
+      </a:lt2>
+      <a:accent1>
+        <a:srgbClr val="BBE0E3"/>
+      </a:accent1>
+      <a:accent2>
+        <a:srgbClr val="333399"/>
+      </a:accent2>
+      <a:accent3>
+        <a:srgbClr val="FFFFFF"/>
+      </a:accent3>
+      <a:accent4>
+        <a:srgbClr val="000000"/>
+      </a:accent4>
+      <a:accent5>
+        <a:srgbClr val="DAEDEF"/>
+      </a:accent5>
+      <a:accent6>
+        <a:srgbClr val="2D2D8A"/>
+      </a:accent6>
+      <a:hlink>
+        <a:srgbClr val="009999"/>
+      </a:hlink>
+      <a:folHlink>
+        <a:srgbClr val="99CC00"/>
+      </a:folHlink>
+    </a:clrScheme>
+    <a:fontScheme name="Office">
+      <a:majorFont>
+        <a:latin typeface="Calibri"/>
+        <a:ea typeface=""/>
+        <a:cs typeface=""/>
+        <a:font script="Jpan" typeface="ＭＳ Ｐゴシック"/>
+        <a:font script="Hang" typeface="맑은 고딕"/>
+        <a:font script="Hans" typeface="宋体"/>
+        <a:font script="Hant" typeface="新細明體"/>
+        <a:font script="Arab" typeface="Times New Roman"/>
+        <a:font script="Hebr" typeface="Times New Roman"/>
+        <a:font script="Thai" typeface="Angsana New"/>
+        <a:font script="Ethi" typeface="Nyala"/>
+        <a:font script="Beng" typeface="Vrinda"/>
+        <a:font script="Gujr" typeface="Shruti"/>
+        <a:font script="Khmr" typeface="MoolBoran"/>
+        <a:font script="Knda" typeface="Tunga"/>
+        <a:font script="Guru" typeface="Raavi"/>
+        <a:font script="Cans" typeface="Euphemia"/>
+        <a:font script="Cher" typeface="Plantagenet Cherokee"/>
+        <a:font script="Yiii" typeface="Microsoft Yi Baiti"/>
+        <a:font script="Tibt" typeface="Microsoft Himalaya"/>
+        <a:font script="Thaa" typeface="MV Boli"/>
+        <a:font script="Deva" typeface="Mangal"/>
+        <a:font script="Telu" typeface="Gautami"/>
+        <a:font script="Taml" typeface="Latha"/>
+        <a:font script="Syrc" typeface="Estrangelo Edessa"/>
+        <a:font script="Orya" typeface="Kalinga"/>
+        <a:font script="Mlym" typeface="Kartika"/>
+        <a:font script="Laoo" typeface="DokChampa"/>
+        <a:font script="Sinh" typeface="Iskoola Pota"/>
+        <a:font script="Mong" typeface="Mongolian Baiti"/>
+        <a:font script="Viet" typeface="Times New Roman"/>
+        <a:font script="Uigh" typeface="Microsoft Uighur"/>
+      </a:majorFont>
+      <a:minorFont>
+        <a:latin typeface="Calibri"/>
+        <a:ea typeface=""/>
+        <a:cs typeface=""/>
+        <a:font script="Jpan" typeface="ＭＳ Ｐゴシック"/>
+        <a:font script="Hang" typeface="맑은 고딕"/>
+        <a:font script="Hans" typeface="宋体"/>
+        <a:font script="Hant" typeface="新細明體"/>
+        <a:font script="Arab" typeface="Arial"/>
+        <a:font script="Hebr" typeface="Arial"/>
+        <a:font script="Thai" typeface="Cordia New"/>
+        <a:font script="Ethi" typeface="Nyala"/>
+        <a:font script="Beng" typeface="Vrinda"/>
+        <a:font script="Gujr" typeface="Shruti"/>
+        <a:font script="Khmr" typeface="DaunPenh"/>
+        <a:font script="Knda" typeface="Tunga"/>
+        <a:font script="Guru" typeface="Raavi"/>
+        <a:font script="Cans" typeface="Euphemia"/>
+        <a:font script="Cher" typeface="Plantagenet Cherokee"/>
+        <a:font script="Yiii" typeface="Microsoft Yi Baiti"/>
+        <a:font script="Tibt" typeface="Microsoft Himalaya"/>
+        <a:font script="Thaa" typeface="MV Boli"/>
+        <a:font script="Deva" typeface="Mangal"/>
+        <a:font script="Telu" typeface="Gautami"/>
+        <a:font script="Taml" typeface="Latha"/>
+        <a:font script="Syrc" typeface="Estrangelo Edessa"/>
+        <a:font script="Orya" typeface="Kalinga"/>
+        <a:font script="Mlym" typeface="Kartika"/>
+        <a:font script="Laoo" typeface="DokChampa"/>
+        <a:font script="Sinh" typeface="Iskoola Pota"/>
+        <a:font script="Mong" typeface="Mongolian Baiti"/>
+        <a:font script="Viet" typeface="Arial"/>
+        <a:font script="Uigh" typeface="Microsoft Uighur"/>
+      </a:minorFont>
+    </a:fontScheme>
+    <a:fmtScheme name="Office">
+      <a:fillStyleLst>
+        <a:solidFill>
+          <a:schemeClr val="phClr"/>
+        </a:solidFill>
+        <a:gradFill rotWithShape="1">
+          <a:gsLst>
+            <a:gs pos="0">
+              <a:schemeClr val="phClr">
+                <a:tint val="50000"/>
+                <a:satMod val="300000"/>
+              </a:schemeClr>
+            </a:gs>
+            <a:gs pos="35000">
+              <a:schemeClr val="phClr">
+                <a:tint val="37000"/>
+                <a:satMod val="300000"/>
+              </a:schemeClr>
+            </a:gs>
+            <a:gs pos="100000">
+              <a:schemeClr val="phClr">
+                <a:tint val="15000"/>
+                <a:satMod val="350000"/>
+              </a:schemeClr>
+            </a:gs>
+          </a:gsLst>
+          <a:lin ang="16200000" scaled="1"/>
+        </a:gradFill>
+        <a:gradFill rotWithShape="1">
+          <a:gsLst>
+            <a:gs pos="0">
+              <a:schemeClr val="phClr">
+                <a:shade val="51000"/>
+                <a:satMod val="130000"/>
+              </a:schemeClr>
+            </a:gs>
+            <a:gs pos="80000">
+              <a:schemeClr val="phClr">
+                <a:shade val="93000"/>
+                <a:satMod val="130000"/>
+              </a:schemeClr>
+            </a:gs>
+            <a:gs pos="100000">
+              <a:schemeClr val="phClr">
+                <a:shade val="94000"/>
+                <a:satMod val="135000"/>
+              </a:schemeClr>
+            </a:gs>
+          </a:gsLst>
+          <a:lin ang="16200000" scaled="0"/>
+        </a:gradFill>
+      </a:fillStyleLst>
+      <a:lnStyleLst>
+        <a:ln w="9525" cap="flat" cmpd="sng" algn="ctr">
+          <a:solidFill>
+            <a:schemeClr val="phClr">
+              <a:shade val="95000"/>
+              <a:satMod val="105000"/>
+            </a:schemeClr>
+          </a:solidFill>
+          <a:prstDash val="solid"/>
+        </a:ln>
+        <a:ln w="25400" cap="flat" cmpd="sng" algn="ctr">
+          <a:solidFill>
+            <a:schemeClr val="phClr"/>
+          </a:solidFill>
+          <a:prstDash val="solid"/>
+        </a:ln>
+        <a:ln w="38100" cap="flat" cmpd="sng" algn="ctr">
+          <a:solidFill>
+            <a:schemeClr val="phClr"/>
+          </a:solidFill>
+          <a:prstDash val="solid"/>
+        </a:ln>
+      </a:lnStyleLst>
+      <a:effectStyleLst>
+        <a:effectStyle>
+          <a:effectLst>
+            <a:outerShdw blurRad="40000" dist="20000" dir="5400000" rotWithShape="0">
+              <a:srgbClr val="000000">
+                <a:alpha val="38000"/>
+              </a:srgbClr>
+            </a:outerShdw>
+          </a:effectLst>
+        </a:effectStyle>
+        <a:effectStyle>
+          <a:effectLst>
+            <a:outerShdw blurRad="40000" dist="23000" dir="5400000" rotWithShape="0">
+              <a:srgbClr val="000000">
+                <a:alpha val="35000"/>
+              </a:srgbClr>
+            </a:outerShdw>
+          </a:effectLst>
+        </a:effectStyle>
+        <a:effectStyle>
+          <a:effectLst>
+            <a:outerShdw blurRad="40000" dist="23000" dir="5400000" rotWithShape="0">
+              <a:srgbClr val="000000">
+                <a:alpha val="35000"/>
+              </a:srgbClr>
+            </a:outerShdw>
+          </a:effectLst>
+          <a:scene3d>
+            <a:camera prst="orthographicFront">
+              <a:rot lat="0" lon="0" rev="0"/>
+            </a:camera>
+            <a:lightRig rig="threePt" dir="t">
+              <a:rot lat="0" lon="0" rev="1200000"/>
+            </a:lightRig>
+          </a:scene3d>
+          <a:sp3d>
+            <a:bevelT w="63500" h="25400"/>
+          </a:sp3d>
+        </a:effectStyle>
+      </a:effectStyleLst>
+      <a:bgFillStyleLst>
+        <a:solidFill>
+          <a:schemeClr val="phClr"/>
+        </a:solidFill>
+        <a:gradFill rotWithShape="1">
+          <a:gsLst>
+            <a:gs pos="0">
+              <a:schemeClr val="phClr">
+                <a:tint val="40000"/>
+                <a:satMod val="350000"/>
+              </a:schemeClr>
+            </a:gs>
+            <a:gs pos="40000">
+              <a:schemeClr val="phClr">
+                <a:tint val="45000"/>
+                <a:shade val="99000"/>
+                <a:satMod val="350000"/>
+              </a:schemeClr>
+            </a:gs>
+            <a:gs pos="100000">
+              <a:schemeClr val="phClr">
+                <a:shade val="20000"/>
+                <a:satMod val="255000"/>
+              </a:schemeClr>
+            </a:gs>
+          </a:gsLst>
+          <a:path path="circle">
+            <a:fillToRect l="50000" t="-80000" r="50000" b="180000"/>
+          </a:path>
+        </a:gradFill>
+        <a:gradFill rotWithShape="1">
+          <a:gsLst>
+            <a:gs pos="0">
+              <a:schemeClr val="phClr">
+                <a:tint val="80000"/>
+                <a:satMod val="300000"/>
+              </a:schemeClr>
+            </a:gs>
+            <a:gs pos="100000">
+              <a:schemeClr val="phClr">
+                <a:shade val="30000"/>
+                <a:satMod val="200000"/>
+              </a:schemeClr>
+            </a:gs>
+          </a:gsLst>
+          <a:path path="circle">
+            <a:fillToRect l="50000" t="50000" r="50000" b="50000"/>
+          </a:path>
+        </a:gradFill>
+      </a:bgFillStyleLst>
+    </a:fmtScheme>
+  </a:themeElements>
+  <a:objectDefaults/>
+  <a:extraClrSchemeLst/>
+</a:theme>
 </file>
</xml_diff>